<commit_message>
Fix #34: Remove OnToggle and OffToggle because is not necessary. Fix issue with Diagnosticlistener on non asp.net core apps
</commit_message>
<xml_diff>
--- a/docs/slides/esquio-overview-101.pptx
+++ b/docs/slides/esquio-overview-101.pptx
@@ -360,7 +360,7 @@
           <a:p>
             <a:fld id="{C312A4EA-1502-4072-B979-7D64E5120D8C}" type="datetimeFigureOut">
               <a:rPr lang="es-ES" smtClean="0"/>
-              <a:t>18/09/2019</a:t>
+              <a:t>20/09/2019</a:t>
             </a:fld>
             <a:endParaRPr lang="es-ES"/>
           </a:p>
@@ -560,7 +560,7 @@
           <a:p>
             <a:fld id="{C312A4EA-1502-4072-B979-7D64E5120D8C}" type="datetimeFigureOut">
               <a:rPr lang="es-ES" smtClean="0"/>
-              <a:t>18/09/2019</a:t>
+              <a:t>20/09/2019</a:t>
             </a:fld>
             <a:endParaRPr lang="es-ES"/>
           </a:p>
@@ -770,7 +770,7 @@
           <a:p>
             <a:fld id="{C312A4EA-1502-4072-B979-7D64E5120D8C}" type="datetimeFigureOut">
               <a:rPr lang="es-ES" smtClean="0"/>
-              <a:t>18/09/2019</a:t>
+              <a:t>20/09/2019</a:t>
             </a:fld>
             <a:endParaRPr lang="es-ES"/>
           </a:p>
@@ -970,7 +970,7 @@
           <a:p>
             <a:fld id="{C312A4EA-1502-4072-B979-7D64E5120D8C}" type="datetimeFigureOut">
               <a:rPr lang="es-ES" smtClean="0"/>
-              <a:t>18/09/2019</a:t>
+              <a:t>20/09/2019</a:t>
             </a:fld>
             <a:endParaRPr lang="es-ES"/>
           </a:p>
@@ -1246,7 +1246,7 @@
           <a:p>
             <a:fld id="{C312A4EA-1502-4072-B979-7D64E5120D8C}" type="datetimeFigureOut">
               <a:rPr lang="es-ES" smtClean="0"/>
-              <a:t>18/09/2019</a:t>
+              <a:t>20/09/2019</a:t>
             </a:fld>
             <a:endParaRPr lang="es-ES"/>
           </a:p>
@@ -1514,7 +1514,7 @@
           <a:p>
             <a:fld id="{C312A4EA-1502-4072-B979-7D64E5120D8C}" type="datetimeFigureOut">
               <a:rPr lang="es-ES" smtClean="0"/>
-              <a:t>18/09/2019</a:t>
+              <a:t>20/09/2019</a:t>
             </a:fld>
             <a:endParaRPr lang="es-ES"/>
           </a:p>
@@ -1929,7 +1929,7 @@
           <a:p>
             <a:fld id="{C312A4EA-1502-4072-B979-7D64E5120D8C}" type="datetimeFigureOut">
               <a:rPr lang="es-ES" smtClean="0"/>
-              <a:t>18/09/2019</a:t>
+              <a:t>20/09/2019</a:t>
             </a:fld>
             <a:endParaRPr lang="es-ES"/>
           </a:p>
@@ -2071,7 +2071,7 @@
           <a:p>
             <a:fld id="{C312A4EA-1502-4072-B979-7D64E5120D8C}" type="datetimeFigureOut">
               <a:rPr lang="es-ES" smtClean="0"/>
-              <a:t>18/09/2019</a:t>
+              <a:t>20/09/2019</a:t>
             </a:fld>
             <a:endParaRPr lang="es-ES"/>
           </a:p>
@@ -2184,7 +2184,7 @@
           <a:p>
             <a:fld id="{C312A4EA-1502-4072-B979-7D64E5120D8C}" type="datetimeFigureOut">
               <a:rPr lang="es-ES" smtClean="0"/>
-              <a:t>18/09/2019</a:t>
+              <a:t>20/09/2019</a:t>
             </a:fld>
             <a:endParaRPr lang="es-ES"/>
           </a:p>
@@ -2497,7 +2497,7 @@
           <a:p>
             <a:fld id="{C312A4EA-1502-4072-B979-7D64E5120D8C}" type="datetimeFigureOut">
               <a:rPr lang="es-ES" smtClean="0"/>
-              <a:t>18/09/2019</a:t>
+              <a:t>20/09/2019</a:t>
             </a:fld>
             <a:endParaRPr lang="es-ES"/>
           </a:p>
@@ -2786,7 +2786,7 @@
           <a:p>
             <a:fld id="{C312A4EA-1502-4072-B979-7D64E5120D8C}" type="datetimeFigureOut">
               <a:rPr lang="es-ES" smtClean="0"/>
-              <a:t>18/09/2019</a:t>
+              <a:t>20/09/2019</a:t>
             </a:fld>
             <a:endParaRPr lang="es-ES"/>
           </a:p>
@@ -3029,7 +3029,7 @@
           <a:p>
             <a:fld id="{C312A4EA-1502-4072-B979-7D64E5120D8C}" type="datetimeFigureOut">
               <a:rPr lang="es-ES" smtClean="0"/>
-              <a:t>18/09/2019</a:t>
+              <a:t>20/09/2019</a:t>
             </a:fld>
             <a:endParaRPr lang="es-ES"/>
           </a:p>
@@ -8779,20 +8779,6 @@
           <a:p>
             <a:r>
               <a:rPr lang="es-ES" sz="2400" i="1" dirty="0" err="1"/>
-              <a:t>OnToggle</a:t>
-            </a:r>
-            <a:endParaRPr lang="es-ES" sz="2400" i="1" dirty="0"/>
-          </a:p>
-          <a:p>
-            <a:r>
-              <a:rPr lang="es-ES" sz="2400" i="1" dirty="0" err="1"/>
-              <a:t>OffToggle</a:t>
-            </a:r>
-            <a:endParaRPr lang="es-ES" sz="2400" i="1" dirty="0"/>
-          </a:p>
-          <a:p>
-            <a:r>
-              <a:rPr lang="es-ES" sz="2400" i="1" dirty="0" err="1"/>
               <a:t>FromToToggle</a:t>
             </a:r>
             <a:endParaRPr lang="es-ES" sz="2400" i="1" dirty="0"/>
@@ -15572,8 +15558,8 @@
               <a:t>, is a </a:t>
             </a:r>
             <a:r>
-              <a:rPr lang="es-ES" sz="2000" b="1" i="1" dirty="0"/>
-              <a:t>deployment</a:t>
+              <a:rPr lang="es-ES" sz="2000" b="1" i="1" dirty="0" err="1"/>
+              <a:t>delivery</a:t>
             </a:r>
             <a:r>
               <a:rPr lang="es-ES" sz="2000" i="1" dirty="0"/>
@@ -15581,7 +15567,7 @@
             </a:r>
             <a:r>
               <a:rPr lang="es-ES" sz="2000" i="1" dirty="0" err="1"/>
-              <a:t>practice</a:t>
+              <a:t>strategy</a:t>
             </a:r>
             <a:r>
               <a:rPr lang="es-ES" sz="2000" i="1" dirty="0"/>

</xml_diff>

<commit_message>
Added Azure DevOps slides to presentation
</commit_message>
<xml_diff>
--- a/docs/slides/esquio-overview-101.pptx
+++ b/docs/slides/esquio-overview-101.pptx
@@ -41,6 +41,8 @@
     <p:sldId id="292" r:id="rId35"/>
     <p:sldId id="298" r:id="rId36"/>
     <p:sldId id="300" r:id="rId37"/>
+    <p:sldId id="302" r:id="rId38"/>
+    <p:sldId id="303" r:id="rId39"/>
   </p:sldIdLst>
   <p:sldSz cx="12192000" cy="6858000"/>
   <p:notesSz cx="6858000" cy="9144000"/>
@@ -202,6 +204,12 @@
             <p14:sldId id="300"/>
           </p14:sldIdLst>
         </p14:section>
+        <p14:section name="Esquio DevOps" id="{9B94ADCF-70F6-4CD4-92C1-1C8DDDD1B8F5}">
+          <p14:sldIdLst>
+            <p14:sldId id="302"/>
+            <p14:sldId id="303"/>
+          </p14:sldIdLst>
+        </p14:section>
       </p14:sectionLst>
     </p:ext>
     <p:ext uri="{EFAFB233-063F-42B5-8137-9DF3F51BA10A}">
@@ -360,7 +368,7 @@
           <a:p>
             <a:fld id="{C312A4EA-1502-4072-B979-7D64E5120D8C}" type="datetimeFigureOut">
               <a:rPr lang="es-ES" smtClean="0"/>
-              <a:t>20/09/2019</a:t>
+              <a:t>22/09/2019</a:t>
             </a:fld>
             <a:endParaRPr lang="es-ES"/>
           </a:p>
@@ -560,7 +568,7 @@
           <a:p>
             <a:fld id="{C312A4EA-1502-4072-B979-7D64E5120D8C}" type="datetimeFigureOut">
               <a:rPr lang="es-ES" smtClean="0"/>
-              <a:t>20/09/2019</a:t>
+              <a:t>22/09/2019</a:t>
             </a:fld>
             <a:endParaRPr lang="es-ES"/>
           </a:p>
@@ -770,7 +778,7 @@
           <a:p>
             <a:fld id="{C312A4EA-1502-4072-B979-7D64E5120D8C}" type="datetimeFigureOut">
               <a:rPr lang="es-ES" smtClean="0"/>
-              <a:t>20/09/2019</a:t>
+              <a:t>22/09/2019</a:t>
             </a:fld>
             <a:endParaRPr lang="es-ES"/>
           </a:p>
@@ -970,7 +978,7 @@
           <a:p>
             <a:fld id="{C312A4EA-1502-4072-B979-7D64E5120D8C}" type="datetimeFigureOut">
               <a:rPr lang="es-ES" smtClean="0"/>
-              <a:t>20/09/2019</a:t>
+              <a:t>22/09/2019</a:t>
             </a:fld>
             <a:endParaRPr lang="es-ES"/>
           </a:p>
@@ -1246,7 +1254,7 @@
           <a:p>
             <a:fld id="{C312A4EA-1502-4072-B979-7D64E5120D8C}" type="datetimeFigureOut">
               <a:rPr lang="es-ES" smtClean="0"/>
-              <a:t>20/09/2019</a:t>
+              <a:t>22/09/2019</a:t>
             </a:fld>
             <a:endParaRPr lang="es-ES"/>
           </a:p>
@@ -1514,7 +1522,7 @@
           <a:p>
             <a:fld id="{C312A4EA-1502-4072-B979-7D64E5120D8C}" type="datetimeFigureOut">
               <a:rPr lang="es-ES" smtClean="0"/>
-              <a:t>20/09/2019</a:t>
+              <a:t>22/09/2019</a:t>
             </a:fld>
             <a:endParaRPr lang="es-ES"/>
           </a:p>
@@ -1929,7 +1937,7 @@
           <a:p>
             <a:fld id="{C312A4EA-1502-4072-B979-7D64E5120D8C}" type="datetimeFigureOut">
               <a:rPr lang="es-ES" smtClean="0"/>
-              <a:t>20/09/2019</a:t>
+              <a:t>22/09/2019</a:t>
             </a:fld>
             <a:endParaRPr lang="es-ES"/>
           </a:p>
@@ -2071,7 +2079,7 @@
           <a:p>
             <a:fld id="{C312A4EA-1502-4072-B979-7D64E5120D8C}" type="datetimeFigureOut">
               <a:rPr lang="es-ES" smtClean="0"/>
-              <a:t>20/09/2019</a:t>
+              <a:t>22/09/2019</a:t>
             </a:fld>
             <a:endParaRPr lang="es-ES"/>
           </a:p>
@@ -2184,7 +2192,7 @@
           <a:p>
             <a:fld id="{C312A4EA-1502-4072-B979-7D64E5120D8C}" type="datetimeFigureOut">
               <a:rPr lang="es-ES" smtClean="0"/>
-              <a:t>20/09/2019</a:t>
+              <a:t>22/09/2019</a:t>
             </a:fld>
             <a:endParaRPr lang="es-ES"/>
           </a:p>
@@ -2497,7 +2505,7 @@
           <a:p>
             <a:fld id="{C312A4EA-1502-4072-B979-7D64E5120D8C}" type="datetimeFigureOut">
               <a:rPr lang="es-ES" smtClean="0"/>
-              <a:t>20/09/2019</a:t>
+              <a:t>22/09/2019</a:t>
             </a:fld>
             <a:endParaRPr lang="es-ES"/>
           </a:p>
@@ -2786,7 +2794,7 @@
           <a:p>
             <a:fld id="{C312A4EA-1502-4072-B979-7D64E5120D8C}" type="datetimeFigureOut">
               <a:rPr lang="es-ES" smtClean="0"/>
-              <a:t>20/09/2019</a:t>
+              <a:t>22/09/2019</a:t>
             </a:fld>
             <a:endParaRPr lang="es-ES"/>
           </a:p>
@@ -3029,7 +3037,7 @@
           <a:p>
             <a:fld id="{C312A4EA-1502-4072-B979-7D64E5120D8C}" type="datetimeFigureOut">
               <a:rPr lang="es-ES" smtClean="0"/>
-              <a:t>20/09/2019</a:t>
+              <a:t>22/09/2019</a:t>
             </a:fld>
             <a:endParaRPr lang="es-ES"/>
           </a:p>
@@ -14053,6 +14061,1055 @@
 </p:sld>
 </file>
 
+<file path=ppt/slides/slide37.xml><?xml version="1.0" encoding="utf-8"?>
+<p:sld xmlns:a="http://schemas.openxmlformats.org/drawingml/2006/main" xmlns:r="http://schemas.openxmlformats.org/officeDocument/2006/relationships" xmlns:p="http://schemas.openxmlformats.org/presentationml/2006/main">
+  <p:cSld>
+    <p:bg>
+      <p:bgPr>
+        <a:solidFill>
+          <a:schemeClr val="bg1"/>
+        </a:solidFill>
+        <a:effectLst/>
+      </p:bgPr>
+    </p:bg>
+    <p:spTree>
+      <p:nvGrpSpPr>
+        <p:cNvPr id="1" name=""/>
+        <p:cNvGrpSpPr/>
+        <p:nvPr/>
+      </p:nvGrpSpPr>
+      <p:grpSpPr>
+        <a:xfrm>
+          <a:off x="0" y="0"/>
+          <a:ext cx="0" cy="0"/>
+          <a:chOff x="0" y="0"/>
+          <a:chExt cx="0" cy="0"/>
+        </a:xfrm>
+      </p:grpSpPr>
+      <p:sp>
+        <p:nvSpPr>
+          <p:cNvPr id="2" name="Title 1">
+            <a:extLst>
+              <a:ext uri="{FF2B5EF4-FFF2-40B4-BE49-F238E27FC236}">
+                <a16:creationId xmlns:a16="http://schemas.microsoft.com/office/drawing/2014/main" id="{AFA3AD09-7FD8-4A45-AAD7-343A60A2E56F}"/>
+              </a:ext>
+            </a:extLst>
+          </p:cNvPr>
+          <p:cNvSpPr>
+            <a:spLocks noGrp="1"/>
+          </p:cNvSpPr>
+          <p:nvPr>
+            <p:ph type="title"/>
+          </p:nvPr>
+        </p:nvSpPr>
+        <p:spPr>
+          <a:xfrm>
+            <a:off x="1136428" y="627564"/>
+            <a:ext cx="7474172" cy="1325563"/>
+          </a:xfrm>
+        </p:spPr>
+        <p:txBody>
+          <a:bodyPr>
+            <a:normAutofit/>
+          </a:bodyPr>
+          <a:lstStyle/>
+          <a:p>
+            <a:r>
+              <a:rPr lang="es-ES" dirty="0" err="1"/>
+              <a:t>Esquio</a:t>
+            </a:r>
+            <a:r>
+              <a:rPr lang="es-ES" dirty="0"/>
+              <a:t> DevOps</a:t>
+            </a:r>
+          </a:p>
+        </p:txBody>
+      </p:sp>
+      <p:sp>
+        <p:nvSpPr>
+          <p:cNvPr id="10" name="Rectangle 9">
+            <a:extLst>
+              <a:ext uri="{FF2B5EF4-FFF2-40B4-BE49-F238E27FC236}">
+                <a16:creationId xmlns:a16="http://schemas.microsoft.com/office/drawing/2014/main" id="{59A309A7-1751-4ABE-A3C1-EEC40366AD89}"/>
+              </a:ext>
+              <a:ext uri="{C183D7F6-B498-43B3-948B-1728B52AA6E4}">
+                <adec:decorative xmlns:adec="http://schemas.microsoft.com/office/drawing/2017/decorative" val="1"/>
+              </a:ext>
+            </a:extLst>
+          </p:cNvPr>
+          <p:cNvSpPr>
+            <a:spLocks noGrp="1" noRot="1" noChangeAspect="1" noMove="1" noResize="1" noEditPoints="1" noAdjustHandles="1" noChangeArrowheads="1" noChangeShapeType="1" noTextEdit="1"/>
+          </p:cNvSpPr>
+          <p:nvPr>
+            <p:extLst>
+              <p:ext uri="{386F3935-93C4-4BCD-93E2-E3B085C9AB24}">
+                <p16:designElem xmlns:p16="http://schemas.microsoft.com/office/powerpoint/2015/main" val="1"/>
+              </p:ext>
+            </p:extLst>
+          </p:nvPr>
+        </p:nvSpPr>
+        <p:spPr>
+          <a:xfrm>
+            <a:off x="10088880" y="0"/>
+            <a:ext cx="2103120" cy="6858000"/>
+          </a:xfrm>
+          <a:prstGeom prst="rect">
+            <a:avLst/>
+          </a:prstGeom>
+          <a:solidFill>
+            <a:srgbClr val="1A5159"/>
+          </a:solidFill>
+          <a:ln>
+            <a:noFill/>
+          </a:ln>
+        </p:spPr>
+        <p:style>
+          <a:lnRef idx="2">
+            <a:schemeClr val="accent1">
+              <a:shade val="50000"/>
+            </a:schemeClr>
+          </a:lnRef>
+          <a:fillRef idx="1">
+            <a:schemeClr val="accent1"/>
+          </a:fillRef>
+          <a:effectRef idx="0">
+            <a:schemeClr val="accent1"/>
+          </a:effectRef>
+          <a:fontRef idx="minor">
+            <a:schemeClr val="lt1"/>
+          </a:fontRef>
+        </p:style>
+        <p:txBody>
+          <a:bodyPr rtlCol="0" anchor="ctr"/>
+          <a:lstStyle/>
+          <a:p>
+            <a:pPr algn="ctr"/>
+            <a:endParaRPr lang="en-US"/>
+          </a:p>
+        </p:txBody>
+      </p:sp>
+      <p:sp>
+        <p:nvSpPr>
+          <p:cNvPr id="12" name="Oval 11">
+            <a:extLst>
+              <a:ext uri="{FF2B5EF4-FFF2-40B4-BE49-F238E27FC236}">
+                <a16:creationId xmlns:a16="http://schemas.microsoft.com/office/drawing/2014/main" id="{967D8EB6-EAE1-4F9C-B398-83321E287204}"/>
+              </a:ext>
+              <a:ext uri="{C183D7F6-B498-43B3-948B-1728B52AA6E4}">
+                <adec:decorative xmlns:adec="http://schemas.microsoft.com/office/drawing/2017/decorative" val="1"/>
+              </a:ext>
+            </a:extLst>
+          </p:cNvPr>
+          <p:cNvSpPr>
+            <a:spLocks noGrp="1" noRot="1" noChangeAspect="1" noMove="1" noResize="1" noEditPoints="1" noAdjustHandles="1" noChangeArrowheads="1" noChangeShapeType="1" noTextEdit="1"/>
+          </p:cNvSpPr>
+          <p:nvPr>
+            <p:extLst>
+              <p:ext uri="{386F3935-93C4-4BCD-93E2-E3B085C9AB24}">
+                <p16:designElem xmlns:p16="http://schemas.microsoft.com/office/powerpoint/2015/main" val="1"/>
+              </p:ext>
+            </p:extLst>
+          </p:nvPr>
+        </p:nvSpPr>
+        <p:spPr>
+          <a:xfrm>
+            <a:off x="8915400" y="2358913"/>
+            <a:ext cx="2140172" cy="2140172"/>
+          </a:xfrm>
+          <a:prstGeom prst="ellipse">
+            <a:avLst/>
+          </a:prstGeom>
+          <a:solidFill>
+            <a:srgbClr val="FFFFFF"/>
+          </a:solidFill>
+          <a:ln w="22225">
+            <a:solidFill>
+              <a:srgbClr val="D5A556"/>
+            </a:solidFill>
+          </a:ln>
+        </p:spPr>
+        <p:style>
+          <a:lnRef idx="2">
+            <a:schemeClr val="accent1">
+              <a:shade val="50000"/>
+            </a:schemeClr>
+          </a:lnRef>
+          <a:fillRef idx="1">
+            <a:schemeClr val="accent1"/>
+          </a:fillRef>
+          <a:effectRef idx="0">
+            <a:schemeClr val="accent1"/>
+          </a:effectRef>
+          <a:fontRef idx="minor">
+            <a:schemeClr val="lt1"/>
+          </a:fontRef>
+        </p:style>
+        <p:txBody>
+          <a:bodyPr rtlCol="0" anchor="ctr"/>
+          <a:lstStyle/>
+          <a:p>
+            <a:pPr algn="ctr"/>
+            <a:endParaRPr lang="en-US"/>
+          </a:p>
+        </p:txBody>
+      </p:sp>
+      <p:pic>
+        <p:nvPicPr>
+          <p:cNvPr id="5" name="Picture 4" descr="A picture containing clipart&#10;&#10;Description automatically generated">
+            <a:extLst>
+              <a:ext uri="{FF2B5EF4-FFF2-40B4-BE49-F238E27FC236}">
+                <a16:creationId xmlns:a16="http://schemas.microsoft.com/office/drawing/2014/main" id="{4B98002B-827A-4805-ABAA-5A4E3B5F2B28}"/>
+              </a:ext>
+            </a:extLst>
+          </p:cNvPr>
+          <p:cNvPicPr>
+            <a:picLocks noChangeAspect="1"/>
+          </p:cNvPicPr>
+          <p:nvPr/>
+        </p:nvPicPr>
+        <p:blipFill>
+          <a:blip r:embed="rId2">
+            <a:extLst>
+              <a:ext uri="{28A0092B-C50C-407E-A947-70E740481C1C}">
+                <a14:useLocalDpi xmlns:a14="http://schemas.microsoft.com/office/drawing/2010/main" val="0"/>
+              </a:ext>
+            </a:extLst>
+          </a:blip>
+          <a:stretch>
+            <a:fillRect/>
+          </a:stretch>
+        </p:blipFill>
+        <p:spPr>
+          <a:xfrm>
+            <a:off x="9606868" y="2857501"/>
+            <a:ext cx="757236" cy="1142998"/>
+          </a:xfrm>
+          <a:prstGeom prst="rect">
+            <a:avLst/>
+          </a:prstGeom>
+        </p:spPr>
+      </p:pic>
+      <p:sp>
+        <p:nvSpPr>
+          <p:cNvPr id="7" name="Content Placeholder 2">
+            <a:extLst>
+              <a:ext uri="{FF2B5EF4-FFF2-40B4-BE49-F238E27FC236}">
+                <a16:creationId xmlns:a16="http://schemas.microsoft.com/office/drawing/2014/main" id="{0D32CEDA-8A37-40FE-8D24-7212061A34DD}"/>
+              </a:ext>
+            </a:extLst>
+          </p:cNvPr>
+          <p:cNvSpPr>
+            <a:spLocks noGrp="1"/>
+          </p:cNvSpPr>
+          <p:nvPr>
+            <p:ph idx="1"/>
+          </p:nvPr>
+        </p:nvSpPr>
+        <p:spPr>
+          <a:xfrm>
+            <a:off x="1136428" y="1953127"/>
+            <a:ext cx="7297358" cy="3567630"/>
+          </a:xfrm>
+        </p:spPr>
+        <p:txBody>
+          <a:bodyPr anchor="ctr">
+            <a:normAutofit/>
+          </a:bodyPr>
+          <a:lstStyle/>
+          <a:p>
+            <a:r>
+              <a:rPr lang="es-ES" sz="2400" dirty="0"/>
+              <a:t>In </a:t>
+            </a:r>
+            <a:r>
+              <a:rPr lang="es-ES" sz="2400" dirty="0" err="1"/>
+              <a:t>Esquio</a:t>
+            </a:r>
+            <a:r>
+              <a:rPr lang="es-ES" sz="2400" dirty="0"/>
+              <a:t> </a:t>
+            </a:r>
+            <a:r>
+              <a:rPr lang="es-ES" sz="2400" dirty="0" err="1"/>
+              <a:t>we</a:t>
+            </a:r>
+            <a:r>
+              <a:rPr lang="es-ES" sz="2400" dirty="0"/>
+              <a:t> </a:t>
+            </a:r>
+            <a:r>
+              <a:rPr lang="es-ES" sz="2400" dirty="0" err="1"/>
+              <a:t>believe</a:t>
+            </a:r>
+            <a:r>
+              <a:rPr lang="es-ES" sz="2400" dirty="0"/>
+              <a:t> </a:t>
+            </a:r>
+            <a:r>
+              <a:rPr lang="es-ES" sz="2400" dirty="0" err="1"/>
+              <a:t>Feature</a:t>
+            </a:r>
+            <a:r>
+              <a:rPr lang="es-ES" sz="2400" dirty="0"/>
+              <a:t> </a:t>
+            </a:r>
+            <a:r>
+              <a:rPr lang="es-ES" sz="2400" dirty="0" err="1"/>
+              <a:t>Toggles</a:t>
+            </a:r>
+            <a:r>
+              <a:rPr lang="es-ES" sz="2400" dirty="0"/>
+              <a:t> </a:t>
+            </a:r>
+            <a:r>
+              <a:rPr lang="es-ES" sz="2400" dirty="0" err="1"/>
+              <a:t>is</a:t>
+            </a:r>
+            <a:r>
+              <a:rPr lang="es-ES" sz="2400" dirty="0"/>
+              <a:t> </a:t>
+            </a:r>
+            <a:r>
+              <a:rPr lang="es-ES" sz="2400" dirty="0" err="1"/>
+              <a:t>not</a:t>
+            </a:r>
+            <a:r>
+              <a:rPr lang="es-ES" sz="2400" dirty="0"/>
+              <a:t> </a:t>
+            </a:r>
+            <a:r>
+              <a:rPr lang="es-ES" sz="2400" dirty="0" err="1"/>
+              <a:t>only</a:t>
+            </a:r>
+            <a:r>
+              <a:rPr lang="es-ES" sz="2400" dirty="0"/>
+              <a:t> a </a:t>
+            </a:r>
+            <a:r>
+              <a:rPr lang="es-ES" sz="2400" dirty="0" err="1"/>
+              <a:t>development</a:t>
+            </a:r>
+            <a:r>
+              <a:rPr lang="es-ES" sz="2400" dirty="0"/>
+              <a:t> </a:t>
+            </a:r>
+            <a:r>
+              <a:rPr lang="es-ES" sz="2400" dirty="0" err="1"/>
+              <a:t>strategy</a:t>
+            </a:r>
+            <a:r>
+              <a:rPr lang="es-ES" sz="2400" dirty="0"/>
+              <a:t>, </a:t>
+            </a:r>
+            <a:r>
+              <a:rPr lang="es-ES" sz="2400" dirty="0" err="1"/>
+              <a:t>but</a:t>
+            </a:r>
+            <a:r>
+              <a:rPr lang="es-ES" sz="2400" dirty="0"/>
+              <a:t> a </a:t>
+            </a:r>
+            <a:r>
+              <a:rPr lang="es-ES" sz="2400" dirty="0" err="1"/>
+              <a:t>delivery</a:t>
+            </a:r>
+            <a:r>
+              <a:rPr lang="es-ES" sz="2400" dirty="0"/>
+              <a:t> </a:t>
+            </a:r>
+            <a:r>
+              <a:rPr lang="es-ES" sz="2400" dirty="0" err="1"/>
+              <a:t>strategy</a:t>
+            </a:r>
+            <a:endParaRPr lang="es-ES" sz="2400" dirty="0"/>
+          </a:p>
+          <a:p>
+            <a:r>
+              <a:rPr lang="es-ES" sz="2400" dirty="0" err="1"/>
+              <a:t>One</a:t>
+            </a:r>
+            <a:r>
+              <a:rPr lang="es-ES" sz="2400" dirty="0"/>
+              <a:t> </a:t>
+            </a:r>
+            <a:r>
+              <a:rPr lang="es-ES" sz="2400" dirty="0" err="1"/>
+              <a:t>of</a:t>
+            </a:r>
+            <a:r>
+              <a:rPr lang="es-ES" sz="2400" dirty="0"/>
+              <a:t> </a:t>
+            </a:r>
+            <a:r>
+              <a:rPr lang="es-ES" sz="2400" dirty="0" err="1"/>
+              <a:t>the</a:t>
+            </a:r>
+            <a:r>
+              <a:rPr lang="es-ES" sz="2400" dirty="0"/>
+              <a:t> </a:t>
+            </a:r>
+            <a:r>
+              <a:rPr lang="es-ES" sz="2400" dirty="0" err="1"/>
+              <a:t>most</a:t>
+            </a:r>
+            <a:r>
+              <a:rPr lang="es-ES" sz="2400" dirty="0"/>
+              <a:t> </a:t>
+            </a:r>
+            <a:r>
+              <a:rPr lang="es-ES" sz="2400" dirty="0" err="1"/>
+              <a:t>important</a:t>
+            </a:r>
+            <a:r>
+              <a:rPr lang="es-ES" sz="2400" dirty="0"/>
+              <a:t> </a:t>
+            </a:r>
+            <a:r>
+              <a:rPr lang="es-ES" sz="2400" dirty="0" err="1"/>
+              <a:t>parts</a:t>
+            </a:r>
+            <a:r>
+              <a:rPr lang="es-ES" sz="2400" dirty="0"/>
+              <a:t> </a:t>
+            </a:r>
+            <a:r>
+              <a:rPr lang="es-ES" sz="2400" dirty="0" err="1"/>
+              <a:t>is</a:t>
+            </a:r>
+            <a:r>
+              <a:rPr lang="es-ES" sz="2400" dirty="0"/>
+              <a:t> </a:t>
+            </a:r>
+            <a:r>
+              <a:rPr lang="es-ES" sz="2400" dirty="0" err="1"/>
+              <a:t>when</a:t>
+            </a:r>
+            <a:r>
+              <a:rPr lang="es-ES" sz="2400" dirty="0"/>
+              <a:t> and </a:t>
+            </a:r>
+            <a:r>
+              <a:rPr lang="es-ES" sz="2400" dirty="0" err="1"/>
+              <a:t>how</a:t>
+            </a:r>
+            <a:r>
+              <a:rPr lang="es-ES" sz="2400" dirty="0"/>
+              <a:t> </a:t>
+            </a:r>
+            <a:r>
+              <a:rPr lang="es-ES" sz="2400" dirty="0" err="1"/>
+              <a:t>features</a:t>
+            </a:r>
+            <a:r>
+              <a:rPr lang="es-ES" sz="2400" dirty="0"/>
+              <a:t> </a:t>
+            </a:r>
+            <a:r>
+              <a:rPr lang="es-ES" sz="2400" dirty="0" err="1"/>
+              <a:t>gets</a:t>
+            </a:r>
+            <a:r>
+              <a:rPr lang="es-ES" sz="2400" dirty="0"/>
+              <a:t> </a:t>
+            </a:r>
+            <a:r>
+              <a:rPr lang="es-ES" sz="2400" dirty="0" err="1"/>
+              <a:t>activated</a:t>
+            </a:r>
+            <a:endParaRPr lang="es-ES" sz="2400" dirty="0"/>
+          </a:p>
+          <a:p>
+            <a:r>
+              <a:rPr lang="es-ES" sz="2400" dirty="0" err="1"/>
+              <a:t>Because</a:t>
+            </a:r>
+            <a:r>
+              <a:rPr lang="es-ES" sz="2400" dirty="0"/>
+              <a:t> </a:t>
+            </a:r>
+            <a:r>
+              <a:rPr lang="es-ES" sz="2400" dirty="0" err="1"/>
+              <a:t>of</a:t>
+            </a:r>
+            <a:r>
+              <a:rPr lang="es-ES" sz="2400" dirty="0"/>
+              <a:t> </a:t>
+            </a:r>
+            <a:r>
+              <a:rPr lang="es-ES" sz="2400" dirty="0" err="1"/>
+              <a:t>that</a:t>
+            </a:r>
+            <a:r>
+              <a:rPr lang="es-ES" sz="2400" dirty="0"/>
+              <a:t> </a:t>
+            </a:r>
+            <a:r>
+              <a:rPr lang="es-ES" sz="2400" dirty="0" err="1"/>
+              <a:t>we</a:t>
+            </a:r>
+            <a:r>
+              <a:rPr lang="es-ES" sz="2400" dirty="0"/>
+              <a:t> </a:t>
+            </a:r>
+            <a:r>
+              <a:rPr lang="es-ES" sz="2400" dirty="0" err="1"/>
+              <a:t>developed</a:t>
+            </a:r>
+            <a:r>
+              <a:rPr lang="es-ES" sz="2400" dirty="0"/>
+              <a:t> </a:t>
+            </a:r>
+            <a:r>
+              <a:rPr lang="es-ES" sz="2400" dirty="0" err="1"/>
+              <a:t>the</a:t>
+            </a:r>
+            <a:r>
+              <a:rPr lang="es-ES" sz="2400" dirty="0"/>
+              <a:t> </a:t>
+            </a:r>
+            <a:r>
+              <a:rPr lang="es-ES" sz="2400" dirty="0" err="1"/>
+              <a:t>Esquio</a:t>
+            </a:r>
+            <a:r>
+              <a:rPr lang="es-ES" sz="2400" dirty="0"/>
+              <a:t> Azure DevOps </a:t>
+            </a:r>
+            <a:r>
+              <a:rPr lang="es-ES" sz="2400" dirty="0" err="1"/>
+              <a:t>tasks</a:t>
+            </a:r>
+            <a:endParaRPr lang="es-ES" sz="1600" dirty="0"/>
+          </a:p>
+          <a:p>
+            <a:pPr marL="0" indent="0">
+              <a:buNone/>
+            </a:pPr>
+            <a:endParaRPr lang="es-ES" sz="2000" i="1" dirty="0"/>
+          </a:p>
+        </p:txBody>
+      </p:sp>
+    </p:spTree>
+    <p:extLst>
+      <p:ext uri="{BB962C8B-B14F-4D97-AF65-F5344CB8AC3E}">
+        <p14:creationId xmlns:p14="http://schemas.microsoft.com/office/powerpoint/2010/main" val="851465468"/>
+      </p:ext>
+    </p:extLst>
+  </p:cSld>
+  <p:clrMapOvr>
+    <a:masterClrMapping/>
+  </p:clrMapOvr>
+</p:sld>
+</file>
+
+<file path=ppt/slides/slide38.xml><?xml version="1.0" encoding="utf-8"?>
+<p:sld xmlns:a="http://schemas.openxmlformats.org/drawingml/2006/main" xmlns:r="http://schemas.openxmlformats.org/officeDocument/2006/relationships" xmlns:p="http://schemas.openxmlformats.org/presentationml/2006/main">
+  <p:cSld>
+    <p:bg>
+      <p:bgPr>
+        <a:solidFill>
+          <a:schemeClr val="bg1"/>
+        </a:solidFill>
+        <a:effectLst/>
+      </p:bgPr>
+    </p:bg>
+    <p:spTree>
+      <p:nvGrpSpPr>
+        <p:cNvPr id="1" name=""/>
+        <p:cNvGrpSpPr/>
+        <p:nvPr/>
+      </p:nvGrpSpPr>
+      <p:grpSpPr>
+        <a:xfrm>
+          <a:off x="0" y="0"/>
+          <a:ext cx="0" cy="0"/>
+          <a:chOff x="0" y="0"/>
+          <a:chExt cx="0" cy="0"/>
+        </a:xfrm>
+      </p:grpSpPr>
+      <p:pic>
+        <p:nvPicPr>
+          <p:cNvPr id="4" name="Picture 3" descr="A screenshot of a cell phone&#10;&#10;Description automatically generated">
+            <a:extLst>
+              <a:ext uri="{FF2B5EF4-FFF2-40B4-BE49-F238E27FC236}">
+                <a16:creationId xmlns:a16="http://schemas.microsoft.com/office/drawing/2014/main" id="{7899758A-C29F-4E91-92D6-511622392049}"/>
+              </a:ext>
+            </a:extLst>
+          </p:cNvPr>
+          <p:cNvPicPr>
+            <a:picLocks noChangeAspect="1"/>
+          </p:cNvPicPr>
+          <p:nvPr/>
+        </p:nvPicPr>
+        <p:blipFill>
+          <a:blip r:embed="rId2">
+            <a:extLst>
+              <a:ext uri="{28A0092B-C50C-407E-A947-70E740481C1C}">
+                <a14:useLocalDpi xmlns:a14="http://schemas.microsoft.com/office/drawing/2010/main" val="0"/>
+              </a:ext>
+            </a:extLst>
+          </a:blip>
+          <a:stretch>
+            <a:fillRect/>
+          </a:stretch>
+        </p:blipFill>
+        <p:spPr>
+          <a:xfrm>
+            <a:off x="6234545" y="687205"/>
+            <a:ext cx="3436983" cy="2411176"/>
+          </a:xfrm>
+          <a:prstGeom prst="rect">
+            <a:avLst/>
+          </a:prstGeom>
+        </p:spPr>
+      </p:pic>
+      <p:sp>
+        <p:nvSpPr>
+          <p:cNvPr id="2" name="Title 1">
+            <a:extLst>
+              <a:ext uri="{FF2B5EF4-FFF2-40B4-BE49-F238E27FC236}">
+                <a16:creationId xmlns:a16="http://schemas.microsoft.com/office/drawing/2014/main" id="{AFA3AD09-7FD8-4A45-AAD7-343A60A2E56F}"/>
+              </a:ext>
+            </a:extLst>
+          </p:cNvPr>
+          <p:cNvSpPr>
+            <a:spLocks noGrp="1"/>
+          </p:cNvSpPr>
+          <p:nvPr>
+            <p:ph type="title"/>
+          </p:nvPr>
+        </p:nvSpPr>
+        <p:spPr>
+          <a:xfrm>
+            <a:off x="1136428" y="627564"/>
+            <a:ext cx="7474172" cy="1325563"/>
+          </a:xfrm>
+        </p:spPr>
+        <p:txBody>
+          <a:bodyPr>
+            <a:normAutofit/>
+          </a:bodyPr>
+          <a:lstStyle/>
+          <a:p>
+            <a:r>
+              <a:rPr lang="es-ES" dirty="0" err="1"/>
+              <a:t>Esquio</a:t>
+            </a:r>
+            <a:r>
+              <a:rPr lang="es-ES" dirty="0"/>
+              <a:t> DevOps </a:t>
+            </a:r>
+            <a:r>
+              <a:rPr lang="es-ES" dirty="0" err="1"/>
+              <a:t>Tasks</a:t>
+            </a:r>
+            <a:endParaRPr lang="es-ES" dirty="0"/>
+          </a:p>
+        </p:txBody>
+      </p:sp>
+      <p:sp>
+        <p:nvSpPr>
+          <p:cNvPr id="10" name="Rectangle 9">
+            <a:extLst>
+              <a:ext uri="{FF2B5EF4-FFF2-40B4-BE49-F238E27FC236}">
+                <a16:creationId xmlns:a16="http://schemas.microsoft.com/office/drawing/2014/main" id="{59A309A7-1751-4ABE-A3C1-EEC40366AD89}"/>
+              </a:ext>
+              <a:ext uri="{C183D7F6-B498-43B3-948B-1728B52AA6E4}">
+                <adec:decorative xmlns:adec="http://schemas.microsoft.com/office/drawing/2017/decorative" val="1"/>
+              </a:ext>
+            </a:extLst>
+          </p:cNvPr>
+          <p:cNvSpPr>
+            <a:spLocks noGrp="1" noRot="1" noChangeAspect="1" noMove="1" noResize="1" noEditPoints="1" noAdjustHandles="1" noChangeArrowheads="1" noChangeShapeType="1" noTextEdit="1"/>
+          </p:cNvSpPr>
+          <p:nvPr>
+            <p:extLst>
+              <p:ext uri="{386F3935-93C4-4BCD-93E2-E3B085C9AB24}">
+                <p16:designElem xmlns:p16="http://schemas.microsoft.com/office/powerpoint/2015/main" val="1"/>
+              </p:ext>
+            </p:extLst>
+          </p:nvPr>
+        </p:nvSpPr>
+        <p:spPr>
+          <a:xfrm>
+            <a:off x="10088880" y="0"/>
+            <a:ext cx="2103120" cy="6858000"/>
+          </a:xfrm>
+          <a:prstGeom prst="rect">
+            <a:avLst/>
+          </a:prstGeom>
+          <a:solidFill>
+            <a:srgbClr val="1A5159"/>
+          </a:solidFill>
+          <a:ln>
+            <a:noFill/>
+          </a:ln>
+        </p:spPr>
+        <p:style>
+          <a:lnRef idx="2">
+            <a:schemeClr val="accent1">
+              <a:shade val="50000"/>
+            </a:schemeClr>
+          </a:lnRef>
+          <a:fillRef idx="1">
+            <a:schemeClr val="accent1"/>
+          </a:fillRef>
+          <a:effectRef idx="0">
+            <a:schemeClr val="accent1"/>
+          </a:effectRef>
+          <a:fontRef idx="minor">
+            <a:schemeClr val="lt1"/>
+          </a:fontRef>
+        </p:style>
+        <p:txBody>
+          <a:bodyPr rtlCol="0" anchor="ctr"/>
+          <a:lstStyle/>
+          <a:p>
+            <a:pPr algn="ctr"/>
+            <a:endParaRPr lang="en-US"/>
+          </a:p>
+        </p:txBody>
+      </p:sp>
+      <p:sp>
+        <p:nvSpPr>
+          <p:cNvPr id="12" name="Oval 11">
+            <a:extLst>
+              <a:ext uri="{FF2B5EF4-FFF2-40B4-BE49-F238E27FC236}">
+                <a16:creationId xmlns:a16="http://schemas.microsoft.com/office/drawing/2014/main" id="{967D8EB6-EAE1-4F9C-B398-83321E287204}"/>
+              </a:ext>
+              <a:ext uri="{C183D7F6-B498-43B3-948B-1728B52AA6E4}">
+                <adec:decorative xmlns:adec="http://schemas.microsoft.com/office/drawing/2017/decorative" val="1"/>
+              </a:ext>
+            </a:extLst>
+          </p:cNvPr>
+          <p:cNvSpPr>
+            <a:spLocks noGrp="1" noRot="1" noChangeAspect="1" noMove="1" noResize="1" noEditPoints="1" noAdjustHandles="1" noChangeArrowheads="1" noChangeShapeType="1" noTextEdit="1"/>
+          </p:cNvSpPr>
+          <p:nvPr>
+            <p:extLst>
+              <p:ext uri="{386F3935-93C4-4BCD-93E2-E3B085C9AB24}">
+                <p16:designElem xmlns:p16="http://schemas.microsoft.com/office/powerpoint/2015/main" val="1"/>
+              </p:ext>
+            </p:extLst>
+          </p:nvPr>
+        </p:nvSpPr>
+        <p:spPr>
+          <a:xfrm>
+            <a:off x="8915400" y="2358913"/>
+            <a:ext cx="2140172" cy="2140172"/>
+          </a:xfrm>
+          <a:prstGeom prst="ellipse">
+            <a:avLst/>
+          </a:prstGeom>
+          <a:solidFill>
+            <a:srgbClr val="FFFFFF"/>
+          </a:solidFill>
+          <a:ln w="22225">
+            <a:solidFill>
+              <a:srgbClr val="D5A556"/>
+            </a:solidFill>
+          </a:ln>
+        </p:spPr>
+        <p:style>
+          <a:lnRef idx="2">
+            <a:schemeClr val="accent1">
+              <a:shade val="50000"/>
+            </a:schemeClr>
+          </a:lnRef>
+          <a:fillRef idx="1">
+            <a:schemeClr val="accent1"/>
+          </a:fillRef>
+          <a:effectRef idx="0">
+            <a:schemeClr val="accent1"/>
+          </a:effectRef>
+          <a:fontRef idx="minor">
+            <a:schemeClr val="lt1"/>
+          </a:fontRef>
+        </p:style>
+        <p:txBody>
+          <a:bodyPr rtlCol="0" anchor="ctr"/>
+          <a:lstStyle/>
+          <a:p>
+            <a:pPr algn="ctr"/>
+            <a:endParaRPr lang="en-US"/>
+          </a:p>
+        </p:txBody>
+      </p:sp>
+      <p:pic>
+        <p:nvPicPr>
+          <p:cNvPr id="5" name="Picture 4" descr="A picture containing clipart&#10;&#10;Description automatically generated">
+            <a:extLst>
+              <a:ext uri="{FF2B5EF4-FFF2-40B4-BE49-F238E27FC236}">
+                <a16:creationId xmlns:a16="http://schemas.microsoft.com/office/drawing/2014/main" id="{4B98002B-827A-4805-ABAA-5A4E3B5F2B28}"/>
+              </a:ext>
+            </a:extLst>
+          </p:cNvPr>
+          <p:cNvPicPr>
+            <a:picLocks noChangeAspect="1"/>
+          </p:cNvPicPr>
+          <p:nvPr/>
+        </p:nvPicPr>
+        <p:blipFill>
+          <a:blip r:embed="rId3">
+            <a:extLst>
+              <a:ext uri="{28A0092B-C50C-407E-A947-70E740481C1C}">
+                <a14:useLocalDpi xmlns:a14="http://schemas.microsoft.com/office/drawing/2010/main" val="0"/>
+              </a:ext>
+            </a:extLst>
+          </a:blip>
+          <a:stretch>
+            <a:fillRect/>
+          </a:stretch>
+        </p:blipFill>
+        <p:spPr>
+          <a:xfrm>
+            <a:off x="9606868" y="2857501"/>
+            <a:ext cx="757236" cy="1142998"/>
+          </a:xfrm>
+          <a:prstGeom prst="rect">
+            <a:avLst/>
+          </a:prstGeom>
+        </p:spPr>
+      </p:pic>
+      <p:sp>
+        <p:nvSpPr>
+          <p:cNvPr id="7" name="Content Placeholder 2">
+            <a:extLst>
+              <a:ext uri="{FF2B5EF4-FFF2-40B4-BE49-F238E27FC236}">
+                <a16:creationId xmlns:a16="http://schemas.microsoft.com/office/drawing/2014/main" id="{0D32CEDA-8A37-40FE-8D24-7212061A34DD}"/>
+              </a:ext>
+            </a:extLst>
+          </p:cNvPr>
+          <p:cNvSpPr>
+            <a:spLocks noGrp="1"/>
+          </p:cNvSpPr>
+          <p:nvPr>
+            <p:ph idx="1"/>
+          </p:nvPr>
+        </p:nvSpPr>
+        <p:spPr>
+          <a:xfrm>
+            <a:off x="1136428" y="1953127"/>
+            <a:ext cx="7297358" cy="3567630"/>
+          </a:xfrm>
+        </p:spPr>
+        <p:txBody>
+          <a:bodyPr anchor="ctr">
+            <a:normAutofit/>
+          </a:bodyPr>
+          <a:lstStyle/>
+          <a:p>
+            <a:r>
+              <a:rPr lang="es-ES" sz="1600" dirty="0" err="1"/>
+              <a:t>This</a:t>
+            </a:r>
+            <a:r>
+              <a:rPr lang="es-ES" sz="1600" dirty="0"/>
+              <a:t> </a:t>
+            </a:r>
+            <a:r>
+              <a:rPr lang="es-ES" sz="1600" dirty="0" err="1"/>
+              <a:t>tasks</a:t>
+            </a:r>
+            <a:r>
+              <a:rPr lang="es-ES" sz="1600" dirty="0"/>
+              <a:t> can be </a:t>
+            </a:r>
+            <a:r>
+              <a:rPr lang="es-ES" sz="1600" dirty="0" err="1"/>
+              <a:t>installed</a:t>
+            </a:r>
+            <a:r>
+              <a:rPr lang="es-ES" sz="1600" dirty="0"/>
+              <a:t> </a:t>
+            </a:r>
+            <a:r>
+              <a:rPr lang="es-ES" sz="1600" dirty="0" err="1"/>
+              <a:t>from</a:t>
+            </a:r>
+            <a:r>
+              <a:rPr lang="es-ES" sz="1600" dirty="0"/>
+              <a:t> Visual Studio Marketplace:</a:t>
+            </a:r>
+          </a:p>
+          <a:p>
+            <a:pPr lvl="1"/>
+            <a:r>
+              <a:rPr lang="es-ES" sz="1200" dirty="0">
+                <a:hlinkClick r:id="rId4"/>
+              </a:rPr>
+              <a:t>https://marketplace.visualstudio.com/items?itemName=xabaril.esquio-extensions</a:t>
+            </a:r>
+            <a:r>
+              <a:rPr lang="es-ES" sz="1200" dirty="0"/>
+              <a:t> </a:t>
+            </a:r>
+          </a:p>
+          <a:p>
+            <a:r>
+              <a:rPr lang="es-ES" sz="1600" dirty="0" err="1"/>
+              <a:t>This</a:t>
+            </a:r>
+            <a:r>
+              <a:rPr lang="es-ES" sz="1600" dirty="0"/>
+              <a:t> </a:t>
+            </a:r>
+            <a:r>
+              <a:rPr lang="es-ES" sz="1600" dirty="0" err="1"/>
+              <a:t>includes</a:t>
+            </a:r>
+            <a:r>
+              <a:rPr lang="es-ES" sz="1600" dirty="0"/>
+              <a:t> </a:t>
+            </a:r>
+            <a:r>
+              <a:rPr lang="es-ES" sz="1600" dirty="0" err="1"/>
+              <a:t>several</a:t>
+            </a:r>
+            <a:r>
+              <a:rPr lang="es-ES" sz="1600" dirty="0"/>
+              <a:t> </a:t>
+            </a:r>
+            <a:r>
+              <a:rPr lang="es-ES" sz="1600" dirty="0" err="1"/>
+              <a:t>extensibility</a:t>
+            </a:r>
+            <a:r>
+              <a:rPr lang="es-ES" sz="1600" dirty="0"/>
+              <a:t> </a:t>
+            </a:r>
+            <a:r>
+              <a:rPr lang="es-ES" sz="1600" dirty="0" err="1"/>
+              <a:t>points</a:t>
+            </a:r>
+            <a:r>
+              <a:rPr lang="es-ES" sz="1600" dirty="0"/>
+              <a:t>:</a:t>
+            </a:r>
+          </a:p>
+          <a:p>
+            <a:pPr lvl="1"/>
+            <a:r>
+              <a:rPr lang="es-ES" sz="1200" dirty="0"/>
+              <a:t>Service </a:t>
+            </a:r>
+            <a:r>
+              <a:rPr lang="es-ES" sz="1200" dirty="0" err="1"/>
+              <a:t>Connection</a:t>
+            </a:r>
+            <a:r>
+              <a:rPr lang="es-ES" sz="1200" dirty="0"/>
+              <a:t>: </a:t>
+            </a:r>
+            <a:r>
+              <a:rPr lang="es-ES" sz="1200" dirty="0" err="1"/>
+              <a:t>to</a:t>
+            </a:r>
+            <a:r>
+              <a:rPr lang="es-ES" sz="1200" dirty="0"/>
+              <a:t> define </a:t>
+            </a:r>
+            <a:r>
+              <a:rPr lang="es-ES" sz="1200" dirty="0" err="1"/>
+              <a:t>connections</a:t>
+            </a:r>
+            <a:r>
+              <a:rPr lang="es-ES" sz="1200" dirty="0"/>
+              <a:t> </a:t>
+            </a:r>
+            <a:r>
+              <a:rPr lang="es-ES" sz="1200" dirty="0" err="1"/>
+              <a:t>to</a:t>
+            </a:r>
+            <a:r>
+              <a:rPr lang="es-ES" sz="1200" dirty="0"/>
+              <a:t> </a:t>
+            </a:r>
+            <a:r>
+              <a:rPr lang="es-ES" sz="1200" dirty="0" err="1"/>
+              <a:t>Esquio</a:t>
+            </a:r>
+            <a:r>
+              <a:rPr lang="es-ES" sz="1200" dirty="0"/>
+              <a:t> API</a:t>
+            </a:r>
+          </a:p>
+          <a:p>
+            <a:pPr lvl="1"/>
+            <a:r>
+              <a:rPr lang="en-US" sz="1200" dirty="0"/>
+              <a:t>Rollout feature with </a:t>
+            </a:r>
+            <a:r>
+              <a:rPr lang="en-US" sz="1200" dirty="0" err="1"/>
+              <a:t>Esquio</a:t>
+            </a:r>
+            <a:r>
+              <a:rPr lang="en-US" sz="1200" dirty="0"/>
+              <a:t> task: to enable a particular feature Toggle</a:t>
+            </a:r>
+          </a:p>
+          <a:p>
+            <a:pPr lvl="1"/>
+            <a:r>
+              <a:rPr lang="en-US" sz="1200" dirty="0"/>
+              <a:t>Rollback feature with </a:t>
+            </a:r>
+            <a:r>
+              <a:rPr lang="en-US" sz="1200" dirty="0" err="1"/>
+              <a:t>Esquio</a:t>
+            </a:r>
+            <a:r>
+              <a:rPr lang="en-US" sz="1200" dirty="0"/>
+              <a:t> task: to disable a particular feature</a:t>
+            </a:r>
+          </a:p>
+          <a:p>
+            <a:pPr lvl="1"/>
+            <a:r>
+              <a:rPr lang="en-US" sz="1200" dirty="0"/>
+              <a:t>Set toggle parameter with </a:t>
+            </a:r>
+            <a:r>
+              <a:rPr lang="en-US" sz="1200" dirty="0" err="1"/>
+              <a:t>Esquio</a:t>
+            </a:r>
+            <a:r>
+              <a:rPr lang="en-US" sz="1200" dirty="0"/>
+              <a:t>: some toggles accept parameters to evaluate them. With this task we can set the value for any parameter.</a:t>
+            </a:r>
+          </a:p>
+          <a:p>
+            <a:r>
+              <a:rPr lang="en-US" sz="1600" dirty="0"/>
+              <a:t>All this tasks can be used in any Azure DevOps pipeline to work in our deployment strategies</a:t>
+            </a:r>
+          </a:p>
+          <a:p>
+            <a:pPr lvl="1"/>
+            <a:endParaRPr lang="es-ES" sz="1200" dirty="0"/>
+          </a:p>
+          <a:p>
+            <a:pPr marL="0" indent="0">
+              <a:buNone/>
+            </a:pPr>
+            <a:endParaRPr lang="es-ES" sz="2000" i="1" dirty="0"/>
+          </a:p>
+        </p:txBody>
+      </p:sp>
+    </p:spTree>
+    <p:extLst>
+      <p:ext uri="{BB962C8B-B14F-4D97-AF65-F5344CB8AC3E}">
+        <p14:creationId xmlns:p14="http://schemas.microsoft.com/office/powerpoint/2010/main" val="4126422138"/>
+      </p:ext>
+    </p:extLst>
+  </p:cSld>
+  <p:clrMapOvr>
+    <a:masterClrMapping/>
+  </p:clrMapOvr>
+</p:sld>
+</file>
+
 <file path=ppt/slides/slide4.xml><?xml version="1.0" encoding="utf-8"?>
 <p:sld xmlns:a="http://schemas.openxmlformats.org/drawingml/2006/main" xmlns:r="http://schemas.openxmlformats.org/officeDocument/2006/relationships" xmlns:p="http://schemas.openxmlformats.org/presentationml/2006/main">
   <p:cSld>

</xml_diff>

<commit_message>
Include roadmap and review some slides
</commit_message>
<xml_diff>
--- a/docs/slides/esquio-overview-101.pptx
+++ b/docs/slides/esquio-overview-101.pptx
@@ -41,6 +41,9 @@
     <p:sldId id="292" r:id="rId35"/>
     <p:sldId id="298" r:id="rId36"/>
     <p:sldId id="300" r:id="rId37"/>
+    <p:sldId id="303" r:id="rId38"/>
+    <p:sldId id="301" r:id="rId39"/>
+    <p:sldId id="302" r:id="rId40"/>
   </p:sldIdLst>
   <p:sldSz cx="12192000" cy="6858000"/>
   <p:notesSz cx="6858000" cy="9144000"/>
@@ -200,6 +203,13 @@
             <p14:sldId id="292"/>
             <p14:sldId id="298"/>
             <p14:sldId id="300"/>
+            <p14:sldId id="303"/>
+          </p14:sldIdLst>
+        </p14:section>
+        <p14:section name="Roadmap" id="{B320E862-357F-4CF4-9C60-A29E1273F1A5}">
+          <p14:sldIdLst>
+            <p14:sldId id="301"/>
+            <p14:sldId id="302"/>
           </p14:sldIdLst>
         </p14:section>
       </p14:sectionLst>
@@ -360,7 +370,7 @@
           <a:p>
             <a:fld id="{C312A4EA-1502-4072-B979-7D64E5120D8C}" type="datetimeFigureOut">
               <a:rPr lang="es-ES" smtClean="0"/>
-              <a:t>20/09/2019</a:t>
+              <a:t>01/10/2019</a:t>
             </a:fld>
             <a:endParaRPr lang="es-ES"/>
           </a:p>
@@ -560,7 +570,7 @@
           <a:p>
             <a:fld id="{C312A4EA-1502-4072-B979-7D64E5120D8C}" type="datetimeFigureOut">
               <a:rPr lang="es-ES" smtClean="0"/>
-              <a:t>20/09/2019</a:t>
+              <a:t>01/10/2019</a:t>
             </a:fld>
             <a:endParaRPr lang="es-ES"/>
           </a:p>
@@ -770,7 +780,7 @@
           <a:p>
             <a:fld id="{C312A4EA-1502-4072-B979-7D64E5120D8C}" type="datetimeFigureOut">
               <a:rPr lang="es-ES" smtClean="0"/>
-              <a:t>20/09/2019</a:t>
+              <a:t>01/10/2019</a:t>
             </a:fld>
             <a:endParaRPr lang="es-ES"/>
           </a:p>
@@ -970,7 +980,7 @@
           <a:p>
             <a:fld id="{C312A4EA-1502-4072-B979-7D64E5120D8C}" type="datetimeFigureOut">
               <a:rPr lang="es-ES" smtClean="0"/>
-              <a:t>20/09/2019</a:t>
+              <a:t>01/10/2019</a:t>
             </a:fld>
             <a:endParaRPr lang="es-ES"/>
           </a:p>
@@ -1246,7 +1256,7 @@
           <a:p>
             <a:fld id="{C312A4EA-1502-4072-B979-7D64E5120D8C}" type="datetimeFigureOut">
               <a:rPr lang="es-ES" smtClean="0"/>
-              <a:t>20/09/2019</a:t>
+              <a:t>01/10/2019</a:t>
             </a:fld>
             <a:endParaRPr lang="es-ES"/>
           </a:p>
@@ -1514,7 +1524,7 @@
           <a:p>
             <a:fld id="{C312A4EA-1502-4072-B979-7D64E5120D8C}" type="datetimeFigureOut">
               <a:rPr lang="es-ES" smtClean="0"/>
-              <a:t>20/09/2019</a:t>
+              <a:t>01/10/2019</a:t>
             </a:fld>
             <a:endParaRPr lang="es-ES"/>
           </a:p>
@@ -1929,7 +1939,7 @@
           <a:p>
             <a:fld id="{C312A4EA-1502-4072-B979-7D64E5120D8C}" type="datetimeFigureOut">
               <a:rPr lang="es-ES" smtClean="0"/>
-              <a:t>20/09/2019</a:t>
+              <a:t>01/10/2019</a:t>
             </a:fld>
             <a:endParaRPr lang="es-ES"/>
           </a:p>
@@ -2071,7 +2081,7 @@
           <a:p>
             <a:fld id="{C312A4EA-1502-4072-B979-7D64E5120D8C}" type="datetimeFigureOut">
               <a:rPr lang="es-ES" smtClean="0"/>
-              <a:t>20/09/2019</a:t>
+              <a:t>01/10/2019</a:t>
             </a:fld>
             <a:endParaRPr lang="es-ES"/>
           </a:p>
@@ -2184,7 +2194,7 @@
           <a:p>
             <a:fld id="{C312A4EA-1502-4072-B979-7D64E5120D8C}" type="datetimeFigureOut">
               <a:rPr lang="es-ES" smtClean="0"/>
-              <a:t>20/09/2019</a:t>
+              <a:t>01/10/2019</a:t>
             </a:fld>
             <a:endParaRPr lang="es-ES"/>
           </a:p>
@@ -2497,7 +2507,7 @@
           <a:p>
             <a:fld id="{C312A4EA-1502-4072-B979-7D64E5120D8C}" type="datetimeFigureOut">
               <a:rPr lang="es-ES" smtClean="0"/>
-              <a:t>20/09/2019</a:t>
+              <a:t>01/10/2019</a:t>
             </a:fld>
             <a:endParaRPr lang="es-ES"/>
           </a:p>
@@ -2786,7 +2796,7 @@
           <a:p>
             <a:fld id="{C312A4EA-1502-4072-B979-7D64E5120D8C}" type="datetimeFigureOut">
               <a:rPr lang="es-ES" smtClean="0"/>
-              <a:t>20/09/2019</a:t>
+              <a:t>01/10/2019</a:t>
             </a:fld>
             <a:endParaRPr lang="es-ES"/>
           </a:p>
@@ -3029,7 +3039,7 @@
           <a:p>
             <a:fld id="{C312A4EA-1502-4072-B979-7D64E5120D8C}" type="datetimeFigureOut">
               <a:rPr lang="es-ES" smtClean="0"/>
-              <a:t>20/09/2019</a:t>
+              <a:t>01/10/2019</a:t>
             </a:fld>
             <a:endParaRPr lang="es-ES"/>
           </a:p>
@@ -5096,7 +5106,7 @@
         </p:blipFill>
         <p:spPr>
           <a:xfrm>
-            <a:off x="0" y="2336870"/>
+            <a:off x="229504" y="2385331"/>
             <a:ext cx="8685896" cy="2568004"/>
           </a:xfrm>
           <a:prstGeom prst="rect">
@@ -6056,7 +6066,7 @@
         </p:blipFill>
         <p:spPr>
           <a:xfrm>
-            <a:off x="444960" y="1619249"/>
+            <a:off x="591803" y="1688991"/>
             <a:ext cx="7096260" cy="4762500"/>
           </a:xfrm>
           <a:prstGeom prst="rect">
@@ -7398,7 +7408,7 @@
         </p:blipFill>
         <p:spPr>
           <a:xfrm>
-            <a:off x="215823" y="4000499"/>
+            <a:off x="161579" y="3791678"/>
             <a:ext cx="6872124" cy="2859264"/>
           </a:xfrm>
           <a:prstGeom prst="rect">
@@ -7468,7 +7478,7 @@
         </p:blipFill>
         <p:spPr>
           <a:xfrm>
-            <a:off x="0" y="1690934"/>
+            <a:off x="-49892" y="1636690"/>
             <a:ext cx="8226152" cy="1990314"/>
           </a:xfrm>
           <a:prstGeom prst="rect">
@@ -12087,7 +12097,7 @@
         </p:blipFill>
         <p:spPr>
           <a:xfrm>
-            <a:off x="0" y="-1"/>
+            <a:off x="0" y="27121"/>
             <a:ext cx="12192000" cy="6858001"/>
           </a:xfrm>
           <a:prstGeom prst="rect">
@@ -13503,7 +13513,7 @@
         </p:spPr>
         <p:txBody>
           <a:bodyPr anchor="ctr">
-            <a:normAutofit fontScale="92500" lnSpcReduction="10000"/>
+            <a:normAutofit lnSpcReduction="10000"/>
           </a:bodyPr>
           <a:lstStyle/>
           <a:p>
@@ -13718,13 +13728,6 @@
               <a:t>ToggleExecutionEnd</a:t>
             </a:r>
             <a:endParaRPr lang="es-ES" sz="1200" i="1" dirty="0"/>
-          </a:p>
-          <a:p>
-            <a:pPr lvl="1"/>
-            <a:r>
-              <a:rPr lang="es-ES" sz="1600" i="1" dirty="0"/>
-              <a:t>Event Trace for Windows</a:t>
-            </a:r>
           </a:p>
           <a:p>
             <a:pPr marL="0" indent="0">
@@ -14032,8 +14035,8 @@
         </p:blipFill>
         <p:spPr>
           <a:xfrm>
-            <a:off x="595902" y="3361858"/>
-            <a:ext cx="4788468" cy="3673052"/>
+            <a:off x="565687" y="3325513"/>
+            <a:ext cx="4593957" cy="3523850"/>
           </a:xfrm>
           <a:prstGeom prst="rect">
             <a:avLst/>
@@ -14044,6 +14047,1195 @@
     <p:extLst>
       <p:ext uri="{BB962C8B-B14F-4D97-AF65-F5344CB8AC3E}">
         <p14:creationId xmlns:p14="http://schemas.microsoft.com/office/powerpoint/2010/main" val="4275628497"/>
+      </p:ext>
+    </p:extLst>
+  </p:cSld>
+  <p:clrMapOvr>
+    <a:masterClrMapping/>
+  </p:clrMapOvr>
+</p:sld>
+</file>
+
+<file path=ppt/slides/slide37.xml><?xml version="1.0" encoding="utf-8"?>
+<p:sld xmlns:a="http://schemas.openxmlformats.org/drawingml/2006/main" xmlns:r="http://schemas.openxmlformats.org/officeDocument/2006/relationships" xmlns:p="http://schemas.openxmlformats.org/presentationml/2006/main">
+  <p:cSld>
+    <p:bg>
+      <p:bgPr>
+        <a:solidFill>
+          <a:schemeClr val="bg1"/>
+        </a:solidFill>
+        <a:effectLst/>
+      </p:bgPr>
+    </p:bg>
+    <p:spTree>
+      <p:nvGrpSpPr>
+        <p:cNvPr id="1" name=""/>
+        <p:cNvGrpSpPr/>
+        <p:nvPr/>
+      </p:nvGrpSpPr>
+      <p:grpSpPr>
+        <a:xfrm>
+          <a:off x="0" y="0"/>
+          <a:ext cx="0" cy="0"/>
+          <a:chOff x="0" y="0"/>
+          <a:chExt cx="0" cy="0"/>
+        </a:xfrm>
+      </p:grpSpPr>
+      <p:sp>
+        <p:nvSpPr>
+          <p:cNvPr id="2" name="Title 1">
+            <a:extLst>
+              <a:ext uri="{FF2B5EF4-FFF2-40B4-BE49-F238E27FC236}">
+                <a16:creationId xmlns:a16="http://schemas.microsoft.com/office/drawing/2014/main" id="{AFA3AD09-7FD8-4A45-AAD7-343A60A2E56F}"/>
+              </a:ext>
+            </a:extLst>
+          </p:cNvPr>
+          <p:cNvSpPr>
+            <a:spLocks noGrp="1"/>
+          </p:cNvSpPr>
+          <p:nvPr>
+            <p:ph type="title"/>
+          </p:nvPr>
+        </p:nvSpPr>
+        <p:spPr>
+          <a:xfrm>
+            <a:off x="1136428" y="627564"/>
+            <a:ext cx="7474172" cy="1325563"/>
+          </a:xfrm>
+        </p:spPr>
+        <p:txBody>
+          <a:bodyPr>
+            <a:normAutofit/>
+          </a:bodyPr>
+          <a:lstStyle/>
+          <a:p>
+            <a:r>
+              <a:rPr lang="es-ES" dirty="0" err="1"/>
+              <a:t>Esquio</a:t>
+            </a:r>
+            <a:r>
+              <a:rPr lang="es-ES" dirty="0"/>
+              <a:t> </a:t>
+            </a:r>
+            <a:r>
+              <a:rPr lang="es-ES" dirty="0" err="1"/>
+              <a:t>Instrumentation</a:t>
+            </a:r>
+            <a:endParaRPr lang="es-ES" dirty="0"/>
+          </a:p>
+        </p:txBody>
+      </p:sp>
+      <p:sp>
+        <p:nvSpPr>
+          <p:cNvPr id="10" name="Rectangle 9">
+            <a:extLst>
+              <a:ext uri="{FF2B5EF4-FFF2-40B4-BE49-F238E27FC236}">
+                <a16:creationId xmlns:a16="http://schemas.microsoft.com/office/drawing/2014/main" id="{59A309A7-1751-4ABE-A3C1-EEC40366AD89}"/>
+              </a:ext>
+              <a:ext uri="{C183D7F6-B498-43B3-948B-1728B52AA6E4}">
+                <adec:decorative xmlns:adec="http://schemas.microsoft.com/office/drawing/2017/decorative" val="1"/>
+              </a:ext>
+            </a:extLst>
+          </p:cNvPr>
+          <p:cNvSpPr>
+            <a:spLocks noGrp="1" noRot="1" noChangeAspect="1" noMove="1" noResize="1" noEditPoints="1" noAdjustHandles="1" noChangeArrowheads="1" noChangeShapeType="1" noTextEdit="1"/>
+          </p:cNvSpPr>
+          <p:nvPr>
+            <p:extLst>
+              <p:ext uri="{386F3935-93C4-4BCD-93E2-E3B085C9AB24}">
+                <p16:designElem xmlns:p16="http://schemas.microsoft.com/office/powerpoint/2015/main" val="1"/>
+              </p:ext>
+            </p:extLst>
+          </p:nvPr>
+        </p:nvSpPr>
+        <p:spPr>
+          <a:xfrm>
+            <a:off x="10088880" y="0"/>
+            <a:ext cx="2103120" cy="6858000"/>
+          </a:xfrm>
+          <a:prstGeom prst="rect">
+            <a:avLst/>
+          </a:prstGeom>
+          <a:solidFill>
+            <a:srgbClr val="1A5159"/>
+          </a:solidFill>
+          <a:ln>
+            <a:noFill/>
+          </a:ln>
+        </p:spPr>
+        <p:style>
+          <a:lnRef idx="2">
+            <a:schemeClr val="accent1">
+              <a:shade val="50000"/>
+            </a:schemeClr>
+          </a:lnRef>
+          <a:fillRef idx="1">
+            <a:schemeClr val="accent1"/>
+          </a:fillRef>
+          <a:effectRef idx="0">
+            <a:schemeClr val="accent1"/>
+          </a:effectRef>
+          <a:fontRef idx="minor">
+            <a:schemeClr val="lt1"/>
+          </a:fontRef>
+        </p:style>
+        <p:txBody>
+          <a:bodyPr rtlCol="0" anchor="ctr"/>
+          <a:lstStyle/>
+          <a:p>
+            <a:pPr algn="ctr"/>
+            <a:endParaRPr lang="en-US"/>
+          </a:p>
+        </p:txBody>
+      </p:sp>
+      <p:sp>
+        <p:nvSpPr>
+          <p:cNvPr id="12" name="Oval 11">
+            <a:extLst>
+              <a:ext uri="{FF2B5EF4-FFF2-40B4-BE49-F238E27FC236}">
+                <a16:creationId xmlns:a16="http://schemas.microsoft.com/office/drawing/2014/main" id="{967D8EB6-EAE1-4F9C-B398-83321E287204}"/>
+              </a:ext>
+              <a:ext uri="{C183D7F6-B498-43B3-948B-1728B52AA6E4}">
+                <adec:decorative xmlns:adec="http://schemas.microsoft.com/office/drawing/2017/decorative" val="1"/>
+              </a:ext>
+            </a:extLst>
+          </p:cNvPr>
+          <p:cNvSpPr>
+            <a:spLocks noGrp="1" noRot="1" noChangeAspect="1" noMove="1" noResize="1" noEditPoints="1" noAdjustHandles="1" noChangeArrowheads="1" noChangeShapeType="1" noTextEdit="1"/>
+          </p:cNvSpPr>
+          <p:nvPr>
+            <p:extLst>
+              <p:ext uri="{386F3935-93C4-4BCD-93E2-E3B085C9AB24}">
+                <p16:designElem xmlns:p16="http://schemas.microsoft.com/office/powerpoint/2015/main" val="1"/>
+              </p:ext>
+            </p:extLst>
+          </p:nvPr>
+        </p:nvSpPr>
+        <p:spPr>
+          <a:xfrm>
+            <a:off x="8915400" y="2358913"/>
+            <a:ext cx="2140172" cy="2140172"/>
+          </a:xfrm>
+          <a:prstGeom prst="ellipse">
+            <a:avLst/>
+          </a:prstGeom>
+          <a:solidFill>
+            <a:srgbClr val="FFFFFF"/>
+          </a:solidFill>
+          <a:ln w="22225">
+            <a:solidFill>
+              <a:srgbClr val="D5A556"/>
+            </a:solidFill>
+          </a:ln>
+        </p:spPr>
+        <p:style>
+          <a:lnRef idx="2">
+            <a:schemeClr val="accent1">
+              <a:shade val="50000"/>
+            </a:schemeClr>
+          </a:lnRef>
+          <a:fillRef idx="1">
+            <a:schemeClr val="accent1"/>
+          </a:fillRef>
+          <a:effectRef idx="0">
+            <a:schemeClr val="accent1"/>
+          </a:effectRef>
+          <a:fontRef idx="minor">
+            <a:schemeClr val="lt1"/>
+          </a:fontRef>
+        </p:style>
+        <p:txBody>
+          <a:bodyPr rtlCol="0" anchor="ctr"/>
+          <a:lstStyle/>
+          <a:p>
+            <a:pPr algn="ctr"/>
+            <a:endParaRPr lang="en-US"/>
+          </a:p>
+        </p:txBody>
+      </p:sp>
+      <p:pic>
+        <p:nvPicPr>
+          <p:cNvPr id="5" name="Picture 4" descr="A picture containing clipart&#10;&#10;Description automatically generated">
+            <a:extLst>
+              <a:ext uri="{FF2B5EF4-FFF2-40B4-BE49-F238E27FC236}">
+                <a16:creationId xmlns:a16="http://schemas.microsoft.com/office/drawing/2014/main" id="{4B98002B-827A-4805-ABAA-5A4E3B5F2B28}"/>
+              </a:ext>
+            </a:extLst>
+          </p:cNvPr>
+          <p:cNvPicPr>
+            <a:picLocks noChangeAspect="1"/>
+          </p:cNvPicPr>
+          <p:nvPr/>
+        </p:nvPicPr>
+        <p:blipFill>
+          <a:blip r:embed="rId2">
+            <a:extLst>
+              <a:ext uri="{28A0092B-C50C-407E-A947-70E740481C1C}">
+                <a14:useLocalDpi xmlns:a14="http://schemas.microsoft.com/office/drawing/2010/main" val="0"/>
+              </a:ext>
+            </a:extLst>
+          </a:blip>
+          <a:stretch>
+            <a:fillRect/>
+          </a:stretch>
+        </p:blipFill>
+        <p:spPr>
+          <a:xfrm>
+            <a:off x="9606868" y="2857501"/>
+            <a:ext cx="757236" cy="1142998"/>
+          </a:xfrm>
+          <a:prstGeom prst="rect">
+            <a:avLst/>
+          </a:prstGeom>
+        </p:spPr>
+      </p:pic>
+      <p:pic>
+        <p:nvPicPr>
+          <p:cNvPr id="6" name="Picture 5">
+            <a:extLst>
+              <a:ext uri="{FF2B5EF4-FFF2-40B4-BE49-F238E27FC236}">
+                <a16:creationId xmlns:a16="http://schemas.microsoft.com/office/drawing/2014/main" id="{0B9D36AB-795C-4682-A9C8-1BDA5CA550BC}"/>
+              </a:ext>
+            </a:extLst>
+          </p:cNvPr>
+          <p:cNvPicPr>
+            <a:picLocks noChangeAspect="1"/>
+          </p:cNvPicPr>
+          <p:nvPr/>
+        </p:nvPicPr>
+        <p:blipFill>
+          <a:blip r:embed="rId3">
+            <a:extLst>
+              <a:ext uri="{28A0092B-C50C-407E-A947-70E740481C1C}">
+                <a14:useLocalDpi xmlns:a14="http://schemas.microsoft.com/office/drawing/2010/main" val="0"/>
+              </a:ext>
+            </a:extLst>
+          </a:blip>
+          <a:stretch>
+            <a:fillRect/>
+          </a:stretch>
+        </p:blipFill>
+        <p:spPr>
+          <a:xfrm>
+            <a:off x="1373476" y="1829472"/>
+            <a:ext cx="6850456" cy="3377352"/>
+          </a:xfrm>
+          <a:prstGeom prst="rect">
+            <a:avLst/>
+          </a:prstGeom>
+        </p:spPr>
+      </p:pic>
+      <p:pic>
+        <p:nvPicPr>
+          <p:cNvPr id="8" name="Picture 7">
+            <a:extLst>
+              <a:ext uri="{FF2B5EF4-FFF2-40B4-BE49-F238E27FC236}">
+                <a16:creationId xmlns:a16="http://schemas.microsoft.com/office/drawing/2014/main" id="{E5498952-B67B-4960-87DD-C4F9DAA0FAFA}"/>
+              </a:ext>
+            </a:extLst>
+          </p:cNvPr>
+          <p:cNvPicPr>
+            <a:picLocks noChangeAspect="1"/>
+          </p:cNvPicPr>
+          <p:nvPr/>
+        </p:nvPicPr>
+        <p:blipFill>
+          <a:blip r:embed="rId4">
+            <a:extLst>
+              <a:ext uri="{28A0092B-C50C-407E-A947-70E740481C1C}">
+                <a14:useLocalDpi xmlns:a14="http://schemas.microsoft.com/office/drawing/2010/main" val="0"/>
+              </a:ext>
+            </a:extLst>
+          </a:blip>
+          <a:stretch>
+            <a:fillRect/>
+          </a:stretch>
+        </p:blipFill>
+        <p:spPr>
+          <a:xfrm>
+            <a:off x="141874" y="4068304"/>
+            <a:ext cx="7786808" cy="2843940"/>
+          </a:xfrm>
+          <a:prstGeom prst="rect">
+            <a:avLst/>
+          </a:prstGeom>
+        </p:spPr>
+      </p:pic>
+    </p:spTree>
+    <p:extLst>
+      <p:ext uri="{BB962C8B-B14F-4D97-AF65-F5344CB8AC3E}">
+        <p14:creationId xmlns:p14="http://schemas.microsoft.com/office/powerpoint/2010/main" val="1411709644"/>
+      </p:ext>
+    </p:extLst>
+  </p:cSld>
+  <p:clrMapOvr>
+    <a:masterClrMapping/>
+  </p:clrMapOvr>
+</p:sld>
+</file>
+
+<file path=ppt/slides/slide38.xml><?xml version="1.0" encoding="utf-8"?>
+<p:sld xmlns:a="http://schemas.openxmlformats.org/drawingml/2006/main" xmlns:r="http://schemas.openxmlformats.org/officeDocument/2006/relationships" xmlns:p="http://schemas.openxmlformats.org/presentationml/2006/main">
+  <p:cSld>
+    <p:bg>
+      <p:bgPr>
+        <a:solidFill>
+          <a:schemeClr val="bg1"/>
+        </a:solidFill>
+        <a:effectLst/>
+      </p:bgPr>
+    </p:bg>
+    <p:spTree>
+      <p:nvGrpSpPr>
+        <p:cNvPr id="1" name=""/>
+        <p:cNvGrpSpPr/>
+        <p:nvPr/>
+      </p:nvGrpSpPr>
+      <p:grpSpPr>
+        <a:xfrm>
+          <a:off x="0" y="0"/>
+          <a:ext cx="0" cy="0"/>
+          <a:chOff x="0" y="0"/>
+          <a:chExt cx="0" cy="0"/>
+        </a:xfrm>
+      </p:grpSpPr>
+      <p:sp>
+        <p:nvSpPr>
+          <p:cNvPr id="2" name="Title 1">
+            <a:extLst>
+              <a:ext uri="{FF2B5EF4-FFF2-40B4-BE49-F238E27FC236}">
+                <a16:creationId xmlns:a16="http://schemas.microsoft.com/office/drawing/2014/main" id="{AFA3AD09-7FD8-4A45-AAD7-343A60A2E56F}"/>
+              </a:ext>
+            </a:extLst>
+          </p:cNvPr>
+          <p:cNvSpPr>
+            <a:spLocks noGrp="1"/>
+          </p:cNvSpPr>
+          <p:nvPr>
+            <p:ph type="title"/>
+          </p:nvPr>
+        </p:nvSpPr>
+        <p:spPr>
+          <a:xfrm>
+            <a:off x="1136428" y="627564"/>
+            <a:ext cx="7474172" cy="1325563"/>
+          </a:xfrm>
+        </p:spPr>
+        <p:txBody>
+          <a:bodyPr>
+            <a:normAutofit/>
+          </a:bodyPr>
+          <a:lstStyle/>
+          <a:p>
+            <a:r>
+              <a:rPr lang="es-ES" dirty="0" err="1"/>
+              <a:t>Roadmap</a:t>
+            </a:r>
+            <a:endParaRPr lang="es-ES" dirty="0"/>
+          </a:p>
+        </p:txBody>
+      </p:sp>
+      <p:sp>
+        <p:nvSpPr>
+          <p:cNvPr id="10" name="Rectangle 9">
+            <a:extLst>
+              <a:ext uri="{FF2B5EF4-FFF2-40B4-BE49-F238E27FC236}">
+                <a16:creationId xmlns:a16="http://schemas.microsoft.com/office/drawing/2014/main" id="{59A309A7-1751-4ABE-A3C1-EEC40366AD89}"/>
+              </a:ext>
+              <a:ext uri="{C183D7F6-B498-43B3-948B-1728B52AA6E4}">
+                <adec:decorative xmlns:adec="http://schemas.microsoft.com/office/drawing/2017/decorative" val="1"/>
+              </a:ext>
+            </a:extLst>
+          </p:cNvPr>
+          <p:cNvSpPr>
+            <a:spLocks noGrp="1" noRot="1" noChangeAspect="1" noMove="1" noResize="1" noEditPoints="1" noAdjustHandles="1" noChangeArrowheads="1" noChangeShapeType="1" noTextEdit="1"/>
+          </p:cNvSpPr>
+          <p:nvPr>
+            <p:extLst>
+              <p:ext uri="{386F3935-93C4-4BCD-93E2-E3B085C9AB24}">
+                <p16:designElem xmlns:p16="http://schemas.microsoft.com/office/powerpoint/2015/main" val="1"/>
+              </p:ext>
+            </p:extLst>
+          </p:nvPr>
+        </p:nvSpPr>
+        <p:spPr>
+          <a:xfrm>
+            <a:off x="10088880" y="0"/>
+            <a:ext cx="2103120" cy="6858000"/>
+          </a:xfrm>
+          <a:prstGeom prst="rect">
+            <a:avLst/>
+          </a:prstGeom>
+          <a:solidFill>
+            <a:srgbClr val="1A5159"/>
+          </a:solidFill>
+          <a:ln>
+            <a:noFill/>
+          </a:ln>
+        </p:spPr>
+        <p:style>
+          <a:lnRef idx="2">
+            <a:schemeClr val="accent1">
+              <a:shade val="50000"/>
+            </a:schemeClr>
+          </a:lnRef>
+          <a:fillRef idx="1">
+            <a:schemeClr val="accent1"/>
+          </a:fillRef>
+          <a:effectRef idx="0">
+            <a:schemeClr val="accent1"/>
+          </a:effectRef>
+          <a:fontRef idx="minor">
+            <a:schemeClr val="lt1"/>
+          </a:fontRef>
+        </p:style>
+        <p:txBody>
+          <a:bodyPr rtlCol="0" anchor="ctr"/>
+          <a:lstStyle/>
+          <a:p>
+            <a:pPr algn="ctr"/>
+            <a:endParaRPr lang="en-US"/>
+          </a:p>
+        </p:txBody>
+      </p:sp>
+      <p:sp>
+        <p:nvSpPr>
+          <p:cNvPr id="12" name="Oval 11">
+            <a:extLst>
+              <a:ext uri="{FF2B5EF4-FFF2-40B4-BE49-F238E27FC236}">
+                <a16:creationId xmlns:a16="http://schemas.microsoft.com/office/drawing/2014/main" id="{967D8EB6-EAE1-4F9C-B398-83321E287204}"/>
+              </a:ext>
+              <a:ext uri="{C183D7F6-B498-43B3-948B-1728B52AA6E4}">
+                <adec:decorative xmlns:adec="http://schemas.microsoft.com/office/drawing/2017/decorative" val="1"/>
+              </a:ext>
+            </a:extLst>
+          </p:cNvPr>
+          <p:cNvSpPr>
+            <a:spLocks noGrp="1" noRot="1" noChangeAspect="1" noMove="1" noResize="1" noEditPoints="1" noAdjustHandles="1" noChangeArrowheads="1" noChangeShapeType="1" noTextEdit="1"/>
+          </p:cNvSpPr>
+          <p:nvPr>
+            <p:extLst>
+              <p:ext uri="{386F3935-93C4-4BCD-93E2-E3B085C9AB24}">
+                <p16:designElem xmlns:p16="http://schemas.microsoft.com/office/powerpoint/2015/main" val="1"/>
+              </p:ext>
+            </p:extLst>
+          </p:nvPr>
+        </p:nvSpPr>
+        <p:spPr>
+          <a:xfrm>
+            <a:off x="8915400" y="2358913"/>
+            <a:ext cx="2140172" cy="2140172"/>
+          </a:xfrm>
+          <a:prstGeom prst="ellipse">
+            <a:avLst/>
+          </a:prstGeom>
+          <a:solidFill>
+            <a:srgbClr val="FFFFFF"/>
+          </a:solidFill>
+          <a:ln w="22225">
+            <a:solidFill>
+              <a:srgbClr val="D5A556"/>
+            </a:solidFill>
+          </a:ln>
+        </p:spPr>
+        <p:style>
+          <a:lnRef idx="2">
+            <a:schemeClr val="accent1">
+              <a:shade val="50000"/>
+            </a:schemeClr>
+          </a:lnRef>
+          <a:fillRef idx="1">
+            <a:schemeClr val="accent1"/>
+          </a:fillRef>
+          <a:effectRef idx="0">
+            <a:schemeClr val="accent1"/>
+          </a:effectRef>
+          <a:fontRef idx="minor">
+            <a:schemeClr val="lt1"/>
+          </a:fontRef>
+        </p:style>
+        <p:txBody>
+          <a:bodyPr rtlCol="0" anchor="ctr"/>
+          <a:lstStyle/>
+          <a:p>
+            <a:pPr algn="ctr"/>
+            <a:endParaRPr lang="en-US"/>
+          </a:p>
+        </p:txBody>
+      </p:sp>
+      <p:pic>
+        <p:nvPicPr>
+          <p:cNvPr id="5" name="Picture 4" descr="A picture containing clipart&#10;&#10;Description automatically generated">
+            <a:extLst>
+              <a:ext uri="{FF2B5EF4-FFF2-40B4-BE49-F238E27FC236}">
+                <a16:creationId xmlns:a16="http://schemas.microsoft.com/office/drawing/2014/main" id="{4B98002B-827A-4805-ABAA-5A4E3B5F2B28}"/>
+              </a:ext>
+            </a:extLst>
+          </p:cNvPr>
+          <p:cNvPicPr>
+            <a:picLocks noChangeAspect="1"/>
+          </p:cNvPicPr>
+          <p:nvPr/>
+        </p:nvPicPr>
+        <p:blipFill>
+          <a:blip r:embed="rId2">
+            <a:extLst>
+              <a:ext uri="{28A0092B-C50C-407E-A947-70E740481C1C}">
+                <a14:useLocalDpi xmlns:a14="http://schemas.microsoft.com/office/drawing/2010/main" val="0"/>
+              </a:ext>
+            </a:extLst>
+          </a:blip>
+          <a:stretch>
+            <a:fillRect/>
+          </a:stretch>
+        </p:blipFill>
+        <p:spPr>
+          <a:xfrm>
+            <a:off x="9606868" y="2857501"/>
+            <a:ext cx="757236" cy="1142998"/>
+          </a:xfrm>
+          <a:prstGeom prst="rect">
+            <a:avLst/>
+          </a:prstGeom>
+        </p:spPr>
+      </p:pic>
+      <p:sp>
+        <p:nvSpPr>
+          <p:cNvPr id="7" name="Content Placeholder 2">
+            <a:extLst>
+              <a:ext uri="{FF2B5EF4-FFF2-40B4-BE49-F238E27FC236}">
+                <a16:creationId xmlns:a16="http://schemas.microsoft.com/office/drawing/2014/main" id="{0D32CEDA-8A37-40FE-8D24-7212061A34DD}"/>
+              </a:ext>
+            </a:extLst>
+          </p:cNvPr>
+          <p:cNvSpPr>
+            <a:spLocks noGrp="1"/>
+          </p:cNvSpPr>
+          <p:nvPr>
+            <p:ph idx="1"/>
+          </p:nvPr>
+        </p:nvSpPr>
+        <p:spPr>
+          <a:xfrm>
+            <a:off x="1136428" y="1750094"/>
+            <a:ext cx="7297358" cy="3567630"/>
+          </a:xfrm>
+        </p:spPr>
+        <p:txBody>
+          <a:bodyPr anchor="ctr">
+            <a:normAutofit/>
+          </a:bodyPr>
+          <a:lstStyle/>
+          <a:p>
+            <a:r>
+              <a:rPr lang="es-ES" sz="2400" i="1" dirty="0" err="1"/>
+              <a:t>Esquio</a:t>
+            </a:r>
+            <a:r>
+              <a:rPr lang="es-ES" sz="2400" i="1" dirty="0"/>
+              <a:t> 1.1 </a:t>
+            </a:r>
+            <a:r>
+              <a:rPr lang="es-ES" sz="2400" i="1" dirty="0" err="1"/>
+              <a:t>November</a:t>
+            </a:r>
+            <a:r>
+              <a:rPr lang="es-ES" sz="2400" i="1" dirty="0"/>
+              <a:t> 2019 </a:t>
+            </a:r>
+          </a:p>
+          <a:p>
+            <a:pPr lvl="1"/>
+            <a:r>
+              <a:rPr lang="es-ES" sz="1600" i="1" dirty="0" err="1"/>
+              <a:t>Plugable</a:t>
+            </a:r>
+            <a:r>
+              <a:rPr lang="es-ES" sz="1600" i="1" dirty="0"/>
+              <a:t> </a:t>
+            </a:r>
+            <a:r>
+              <a:rPr lang="es-ES" sz="1600" i="1" dirty="0" err="1"/>
+              <a:t>Partitioner</a:t>
+            </a:r>
+            <a:r>
+              <a:rPr lang="es-ES" sz="1600" i="1" dirty="0"/>
+              <a:t>. </a:t>
+            </a:r>
+            <a:r>
+              <a:rPr lang="es-ES" sz="1600" b="1" i="1" dirty="0"/>
+              <a:t>[done]</a:t>
+            </a:r>
+          </a:p>
+          <a:p>
+            <a:pPr lvl="1"/>
+            <a:r>
+              <a:rPr lang="es-ES" sz="1600" i="1" dirty="0"/>
+              <a:t>New ASP.NET Core </a:t>
+            </a:r>
+            <a:r>
+              <a:rPr lang="es-ES" sz="1600" i="1" dirty="0" err="1"/>
+              <a:t>Toggles</a:t>
+            </a:r>
+            <a:r>
+              <a:rPr lang="es-ES" sz="1600" i="1" dirty="0"/>
+              <a:t>. </a:t>
+            </a:r>
+            <a:r>
+              <a:rPr lang="es-ES" sz="1600" b="1" i="1" dirty="0"/>
+              <a:t>[done]</a:t>
+            </a:r>
+          </a:p>
+          <a:p>
+            <a:pPr lvl="1"/>
+            <a:r>
+              <a:rPr lang="es-ES" sz="1600" i="1" dirty="0" err="1"/>
+              <a:t>Added</a:t>
+            </a:r>
+            <a:r>
+              <a:rPr lang="es-ES" sz="1600" i="1" dirty="0"/>
+              <a:t> </a:t>
+            </a:r>
+            <a:r>
+              <a:rPr lang="es-ES" sz="1600" i="1" dirty="0" err="1"/>
+              <a:t>typed</a:t>
+            </a:r>
+            <a:r>
+              <a:rPr lang="es-ES" sz="1600" i="1" dirty="0"/>
+              <a:t> “</a:t>
+            </a:r>
+            <a:r>
+              <a:rPr lang="es-ES" sz="1600" i="1" dirty="0" err="1"/>
+              <a:t>EventData</a:t>
+            </a:r>
+            <a:r>
+              <a:rPr lang="es-ES" sz="1600" i="1" dirty="0"/>
+              <a:t>” on </a:t>
+            </a:r>
+            <a:r>
+              <a:rPr lang="es-ES" sz="1600" i="1" dirty="0" err="1"/>
+              <a:t>DiagnosticSource</a:t>
+            </a:r>
+            <a:r>
+              <a:rPr lang="es-ES" sz="1600" i="1" dirty="0"/>
+              <a:t> </a:t>
+            </a:r>
+            <a:r>
+              <a:rPr lang="es-ES" sz="1600" i="1" dirty="0" err="1"/>
+              <a:t>events</a:t>
+            </a:r>
+            <a:r>
+              <a:rPr lang="es-ES" sz="1600" i="1" dirty="0"/>
+              <a:t>. </a:t>
+            </a:r>
+            <a:r>
+              <a:rPr lang="es-ES" sz="1600" b="1" i="1" dirty="0"/>
+              <a:t>[done]</a:t>
+            </a:r>
+          </a:p>
+          <a:p>
+            <a:pPr lvl="1"/>
+            <a:r>
+              <a:rPr lang="es-ES" sz="1600" i="1" dirty="0" err="1"/>
+              <a:t>MiniProfiler</a:t>
+            </a:r>
+            <a:r>
+              <a:rPr lang="es-ES" sz="1600" i="1" dirty="0"/>
+              <a:t> </a:t>
+            </a:r>
+            <a:r>
+              <a:rPr lang="es-ES" sz="1600" i="1" dirty="0" err="1"/>
+              <a:t>tool</a:t>
+            </a:r>
+            <a:r>
+              <a:rPr lang="es-ES" sz="1600" i="1" dirty="0"/>
+              <a:t> for </a:t>
+            </a:r>
+            <a:r>
+              <a:rPr lang="es-ES" sz="1600" i="1" dirty="0" err="1"/>
+              <a:t>Esquio</a:t>
+            </a:r>
+            <a:r>
+              <a:rPr lang="es-ES" sz="1600" i="1" dirty="0"/>
+              <a:t> </a:t>
+            </a:r>
+            <a:r>
+              <a:rPr lang="es-ES" sz="1600" i="1" dirty="0" err="1"/>
+              <a:t>features</a:t>
+            </a:r>
+            <a:r>
+              <a:rPr lang="es-ES" sz="1600" i="1" dirty="0"/>
+              <a:t> </a:t>
+            </a:r>
+            <a:r>
+              <a:rPr lang="es-ES" sz="1600" i="1" dirty="0" err="1"/>
+              <a:t>profiling</a:t>
+            </a:r>
+            <a:r>
+              <a:rPr lang="es-ES" sz="1600" i="1" dirty="0"/>
+              <a:t>. </a:t>
+            </a:r>
+            <a:r>
+              <a:rPr lang="es-ES" sz="1600" b="1" i="1" dirty="0"/>
+              <a:t>[done]</a:t>
+            </a:r>
+          </a:p>
+          <a:p>
+            <a:pPr lvl="1"/>
+            <a:r>
+              <a:rPr lang="es-ES" sz="1600" i="1" dirty="0"/>
+              <a:t>UI </a:t>
+            </a:r>
+            <a:r>
+              <a:rPr lang="es-ES" sz="1600" i="1" dirty="0" err="1"/>
+              <a:t>improvements</a:t>
+            </a:r>
+            <a:r>
+              <a:rPr lang="es-ES" sz="1600" i="1" dirty="0"/>
+              <a:t> </a:t>
+            </a:r>
+          </a:p>
+          <a:p>
+            <a:pPr lvl="2"/>
+            <a:r>
+              <a:rPr lang="es-ES" sz="1600" i="1" dirty="0" err="1"/>
+              <a:t>Authorization</a:t>
+            </a:r>
+            <a:r>
+              <a:rPr lang="es-ES" sz="1600" i="1" dirty="0"/>
+              <a:t> ( Reader, Contributor, Management ).</a:t>
+            </a:r>
+          </a:p>
+          <a:p>
+            <a:pPr lvl="2"/>
+            <a:r>
+              <a:rPr lang="es-ES" sz="1600" i="1" dirty="0" err="1"/>
+              <a:t>Improve</a:t>
+            </a:r>
+            <a:r>
+              <a:rPr lang="es-ES" sz="1600" i="1" dirty="0"/>
+              <a:t> Api Key </a:t>
+            </a:r>
+            <a:r>
+              <a:rPr lang="es-ES" sz="1600" i="1" dirty="0" err="1"/>
+              <a:t>management</a:t>
+            </a:r>
+            <a:r>
+              <a:rPr lang="es-ES" sz="1600" i="1" dirty="0"/>
+              <a:t>.</a:t>
+            </a:r>
+          </a:p>
+        </p:txBody>
+      </p:sp>
+    </p:spTree>
+    <p:extLst>
+      <p:ext uri="{BB962C8B-B14F-4D97-AF65-F5344CB8AC3E}">
+        <p14:creationId xmlns:p14="http://schemas.microsoft.com/office/powerpoint/2010/main" val="355640064"/>
+      </p:ext>
+    </p:extLst>
+  </p:cSld>
+  <p:clrMapOvr>
+    <a:masterClrMapping/>
+  </p:clrMapOvr>
+</p:sld>
+</file>
+
+<file path=ppt/slides/slide39.xml><?xml version="1.0" encoding="utf-8"?>
+<p:sld xmlns:a="http://schemas.openxmlformats.org/drawingml/2006/main" xmlns:r="http://schemas.openxmlformats.org/officeDocument/2006/relationships" xmlns:p="http://schemas.openxmlformats.org/presentationml/2006/main">
+  <p:cSld>
+    <p:bg>
+      <p:bgPr>
+        <a:solidFill>
+          <a:schemeClr val="bg1"/>
+        </a:solidFill>
+        <a:effectLst/>
+      </p:bgPr>
+    </p:bg>
+    <p:spTree>
+      <p:nvGrpSpPr>
+        <p:cNvPr id="1" name=""/>
+        <p:cNvGrpSpPr/>
+        <p:nvPr/>
+      </p:nvGrpSpPr>
+      <p:grpSpPr>
+        <a:xfrm>
+          <a:off x="0" y="0"/>
+          <a:ext cx="0" cy="0"/>
+          <a:chOff x="0" y="0"/>
+          <a:chExt cx="0" cy="0"/>
+        </a:xfrm>
+      </p:grpSpPr>
+      <p:sp>
+        <p:nvSpPr>
+          <p:cNvPr id="2" name="Title 1">
+            <a:extLst>
+              <a:ext uri="{FF2B5EF4-FFF2-40B4-BE49-F238E27FC236}">
+                <a16:creationId xmlns:a16="http://schemas.microsoft.com/office/drawing/2014/main" id="{AFA3AD09-7FD8-4A45-AAD7-343A60A2E56F}"/>
+              </a:ext>
+            </a:extLst>
+          </p:cNvPr>
+          <p:cNvSpPr>
+            <a:spLocks noGrp="1"/>
+          </p:cNvSpPr>
+          <p:nvPr>
+            <p:ph type="title"/>
+          </p:nvPr>
+        </p:nvSpPr>
+        <p:spPr>
+          <a:xfrm>
+            <a:off x="1136428" y="627564"/>
+            <a:ext cx="7474172" cy="1325563"/>
+          </a:xfrm>
+        </p:spPr>
+        <p:txBody>
+          <a:bodyPr>
+            <a:normAutofit/>
+          </a:bodyPr>
+          <a:lstStyle/>
+          <a:p>
+            <a:r>
+              <a:rPr lang="es-ES" dirty="0" err="1"/>
+              <a:t>Roadmap</a:t>
+            </a:r>
+            <a:endParaRPr lang="es-ES" dirty="0"/>
+          </a:p>
+        </p:txBody>
+      </p:sp>
+      <p:sp>
+        <p:nvSpPr>
+          <p:cNvPr id="10" name="Rectangle 9">
+            <a:extLst>
+              <a:ext uri="{FF2B5EF4-FFF2-40B4-BE49-F238E27FC236}">
+                <a16:creationId xmlns:a16="http://schemas.microsoft.com/office/drawing/2014/main" id="{59A309A7-1751-4ABE-A3C1-EEC40366AD89}"/>
+              </a:ext>
+              <a:ext uri="{C183D7F6-B498-43B3-948B-1728B52AA6E4}">
+                <adec:decorative xmlns:adec="http://schemas.microsoft.com/office/drawing/2017/decorative" val="1"/>
+              </a:ext>
+            </a:extLst>
+          </p:cNvPr>
+          <p:cNvSpPr>
+            <a:spLocks noGrp="1" noRot="1" noChangeAspect="1" noMove="1" noResize="1" noEditPoints="1" noAdjustHandles="1" noChangeArrowheads="1" noChangeShapeType="1" noTextEdit="1"/>
+          </p:cNvSpPr>
+          <p:nvPr>
+            <p:extLst>
+              <p:ext uri="{386F3935-93C4-4BCD-93E2-E3B085C9AB24}">
+                <p16:designElem xmlns:p16="http://schemas.microsoft.com/office/powerpoint/2015/main" val="1"/>
+              </p:ext>
+            </p:extLst>
+          </p:nvPr>
+        </p:nvSpPr>
+        <p:spPr>
+          <a:xfrm>
+            <a:off x="10088880" y="0"/>
+            <a:ext cx="2103120" cy="6858000"/>
+          </a:xfrm>
+          <a:prstGeom prst="rect">
+            <a:avLst/>
+          </a:prstGeom>
+          <a:solidFill>
+            <a:srgbClr val="1A5159"/>
+          </a:solidFill>
+          <a:ln>
+            <a:noFill/>
+          </a:ln>
+        </p:spPr>
+        <p:style>
+          <a:lnRef idx="2">
+            <a:schemeClr val="accent1">
+              <a:shade val="50000"/>
+            </a:schemeClr>
+          </a:lnRef>
+          <a:fillRef idx="1">
+            <a:schemeClr val="accent1"/>
+          </a:fillRef>
+          <a:effectRef idx="0">
+            <a:schemeClr val="accent1"/>
+          </a:effectRef>
+          <a:fontRef idx="minor">
+            <a:schemeClr val="lt1"/>
+          </a:fontRef>
+        </p:style>
+        <p:txBody>
+          <a:bodyPr rtlCol="0" anchor="ctr"/>
+          <a:lstStyle/>
+          <a:p>
+            <a:pPr algn="ctr"/>
+            <a:endParaRPr lang="en-US"/>
+          </a:p>
+        </p:txBody>
+      </p:sp>
+      <p:sp>
+        <p:nvSpPr>
+          <p:cNvPr id="12" name="Oval 11">
+            <a:extLst>
+              <a:ext uri="{FF2B5EF4-FFF2-40B4-BE49-F238E27FC236}">
+                <a16:creationId xmlns:a16="http://schemas.microsoft.com/office/drawing/2014/main" id="{967D8EB6-EAE1-4F9C-B398-83321E287204}"/>
+              </a:ext>
+              <a:ext uri="{C183D7F6-B498-43B3-948B-1728B52AA6E4}">
+                <adec:decorative xmlns:adec="http://schemas.microsoft.com/office/drawing/2017/decorative" val="1"/>
+              </a:ext>
+            </a:extLst>
+          </p:cNvPr>
+          <p:cNvSpPr>
+            <a:spLocks noGrp="1" noRot="1" noChangeAspect="1" noMove="1" noResize="1" noEditPoints="1" noAdjustHandles="1" noChangeArrowheads="1" noChangeShapeType="1" noTextEdit="1"/>
+          </p:cNvSpPr>
+          <p:nvPr>
+            <p:extLst>
+              <p:ext uri="{386F3935-93C4-4BCD-93E2-E3B085C9AB24}">
+                <p16:designElem xmlns:p16="http://schemas.microsoft.com/office/powerpoint/2015/main" val="1"/>
+              </p:ext>
+            </p:extLst>
+          </p:nvPr>
+        </p:nvSpPr>
+        <p:spPr>
+          <a:xfrm>
+            <a:off x="8915400" y="2358913"/>
+            <a:ext cx="2140172" cy="2140172"/>
+          </a:xfrm>
+          <a:prstGeom prst="ellipse">
+            <a:avLst/>
+          </a:prstGeom>
+          <a:solidFill>
+            <a:srgbClr val="FFFFFF"/>
+          </a:solidFill>
+          <a:ln w="22225">
+            <a:solidFill>
+              <a:srgbClr val="D5A556"/>
+            </a:solidFill>
+          </a:ln>
+        </p:spPr>
+        <p:style>
+          <a:lnRef idx="2">
+            <a:schemeClr val="accent1">
+              <a:shade val="50000"/>
+            </a:schemeClr>
+          </a:lnRef>
+          <a:fillRef idx="1">
+            <a:schemeClr val="accent1"/>
+          </a:fillRef>
+          <a:effectRef idx="0">
+            <a:schemeClr val="accent1"/>
+          </a:effectRef>
+          <a:fontRef idx="minor">
+            <a:schemeClr val="lt1"/>
+          </a:fontRef>
+        </p:style>
+        <p:txBody>
+          <a:bodyPr rtlCol="0" anchor="ctr"/>
+          <a:lstStyle/>
+          <a:p>
+            <a:pPr algn="ctr"/>
+            <a:endParaRPr lang="en-US"/>
+          </a:p>
+        </p:txBody>
+      </p:sp>
+      <p:pic>
+        <p:nvPicPr>
+          <p:cNvPr id="5" name="Picture 4" descr="A picture containing clipart&#10;&#10;Description automatically generated">
+            <a:extLst>
+              <a:ext uri="{FF2B5EF4-FFF2-40B4-BE49-F238E27FC236}">
+                <a16:creationId xmlns:a16="http://schemas.microsoft.com/office/drawing/2014/main" id="{4B98002B-827A-4805-ABAA-5A4E3B5F2B28}"/>
+              </a:ext>
+            </a:extLst>
+          </p:cNvPr>
+          <p:cNvPicPr>
+            <a:picLocks noChangeAspect="1"/>
+          </p:cNvPicPr>
+          <p:nvPr/>
+        </p:nvPicPr>
+        <p:blipFill>
+          <a:blip r:embed="rId2">
+            <a:extLst>
+              <a:ext uri="{28A0092B-C50C-407E-A947-70E740481C1C}">
+                <a14:useLocalDpi xmlns:a14="http://schemas.microsoft.com/office/drawing/2010/main" val="0"/>
+              </a:ext>
+            </a:extLst>
+          </a:blip>
+          <a:stretch>
+            <a:fillRect/>
+          </a:stretch>
+        </p:blipFill>
+        <p:spPr>
+          <a:xfrm>
+            <a:off x="9606868" y="2857501"/>
+            <a:ext cx="757236" cy="1142998"/>
+          </a:xfrm>
+          <a:prstGeom prst="rect">
+            <a:avLst/>
+          </a:prstGeom>
+        </p:spPr>
+      </p:pic>
+      <p:sp>
+        <p:nvSpPr>
+          <p:cNvPr id="7" name="Content Placeholder 2">
+            <a:extLst>
+              <a:ext uri="{FF2B5EF4-FFF2-40B4-BE49-F238E27FC236}">
+                <a16:creationId xmlns:a16="http://schemas.microsoft.com/office/drawing/2014/main" id="{0D32CEDA-8A37-40FE-8D24-7212061A34DD}"/>
+              </a:ext>
+            </a:extLst>
+          </p:cNvPr>
+          <p:cNvSpPr>
+            <a:spLocks noGrp="1"/>
+          </p:cNvSpPr>
+          <p:nvPr>
+            <p:ph idx="1"/>
+          </p:nvPr>
+        </p:nvSpPr>
+        <p:spPr>
+          <a:xfrm>
+            <a:off x="1136428" y="1750094"/>
+            <a:ext cx="7297358" cy="3567630"/>
+          </a:xfrm>
+        </p:spPr>
+        <p:txBody>
+          <a:bodyPr anchor="ctr">
+            <a:normAutofit/>
+          </a:bodyPr>
+          <a:lstStyle/>
+          <a:p>
+            <a:r>
+              <a:rPr lang="es-ES" sz="2400" i="1" dirty="0" err="1"/>
+              <a:t>Esquio</a:t>
+            </a:r>
+            <a:r>
+              <a:rPr lang="es-ES" sz="2400" i="1" dirty="0"/>
+              <a:t> </a:t>
+            </a:r>
+            <a:r>
+              <a:rPr lang="es-ES" sz="2400" i="1" dirty="0" err="1"/>
+              <a:t>vNext</a:t>
+            </a:r>
+            <a:endParaRPr lang="es-ES" sz="2400" i="1" dirty="0"/>
+          </a:p>
+          <a:p>
+            <a:pPr lvl="1"/>
+            <a:r>
+              <a:rPr lang="es-ES" sz="1600" i="1" dirty="0" err="1"/>
+              <a:t>Endpoint</a:t>
+            </a:r>
+            <a:r>
+              <a:rPr lang="es-ES" sz="1600" i="1" dirty="0"/>
+              <a:t> </a:t>
+            </a:r>
+            <a:r>
+              <a:rPr lang="es-ES" sz="1600" i="1" dirty="0" err="1"/>
+              <a:t>fallback</a:t>
+            </a:r>
+            <a:r>
+              <a:rPr lang="es-ES" sz="1600" i="1" dirty="0"/>
+              <a:t> fine </a:t>
+            </a:r>
+            <a:r>
+              <a:rPr lang="es-ES" sz="1600" i="1" dirty="0" err="1"/>
+              <a:t>grain</a:t>
+            </a:r>
+            <a:r>
+              <a:rPr lang="es-ES" sz="1600" i="1" dirty="0"/>
+              <a:t>.</a:t>
+            </a:r>
+          </a:p>
+          <a:p>
+            <a:pPr lvl="1"/>
+            <a:r>
+              <a:rPr lang="es-ES" sz="1600" i="1" dirty="0"/>
+              <a:t>Redis </a:t>
+            </a:r>
+            <a:r>
+              <a:rPr lang="es-ES" sz="1600" i="1" dirty="0" err="1"/>
+              <a:t>configuration</a:t>
+            </a:r>
+            <a:r>
+              <a:rPr lang="es-ES" sz="1600" i="1" dirty="0"/>
+              <a:t> store.</a:t>
+            </a:r>
+          </a:p>
+          <a:p>
+            <a:pPr lvl="1"/>
+            <a:r>
+              <a:rPr lang="es-ES" sz="1600" i="1" dirty="0" err="1"/>
+              <a:t>Hard</a:t>
+            </a:r>
+            <a:r>
+              <a:rPr lang="es-ES" sz="1600" i="1" dirty="0"/>
+              <a:t> </a:t>
+            </a:r>
+            <a:r>
+              <a:rPr lang="es-ES" sz="1600" i="1" dirty="0" err="1"/>
+              <a:t>dependency</a:t>
+            </a:r>
+            <a:r>
+              <a:rPr lang="es-ES" sz="1600" i="1" dirty="0"/>
+              <a:t> on Store </a:t>
+            </a:r>
+            <a:r>
+              <a:rPr lang="es-ES" sz="1600" i="1" dirty="0" err="1"/>
+              <a:t>Context</a:t>
+            </a:r>
+            <a:r>
+              <a:rPr lang="es-ES" sz="1600" i="1" dirty="0"/>
+              <a:t>.</a:t>
+            </a:r>
+          </a:p>
+          <a:p>
+            <a:pPr lvl="1"/>
+            <a:r>
+              <a:rPr lang="es-ES" sz="1600" i="1" dirty="0"/>
+              <a:t>UI </a:t>
+            </a:r>
+            <a:r>
+              <a:rPr lang="es-ES" sz="1600" i="1" dirty="0" err="1"/>
+              <a:t>improvements</a:t>
+            </a:r>
+            <a:endParaRPr lang="es-ES" sz="1600" i="1" dirty="0"/>
+          </a:p>
+          <a:p>
+            <a:pPr lvl="1"/>
+            <a:r>
+              <a:rPr lang="es-ES" sz="1600" i="1" dirty="0"/>
+              <a:t>New Azure DevOps </a:t>
+            </a:r>
+            <a:r>
+              <a:rPr lang="es-ES" sz="1600" i="1" dirty="0" err="1"/>
+              <a:t>tasks</a:t>
+            </a:r>
+            <a:endParaRPr lang="es-ES" sz="1600" i="1" dirty="0"/>
+          </a:p>
+          <a:p>
+            <a:pPr lvl="1"/>
+            <a:r>
+              <a:rPr lang="es-ES" sz="1600" i="1" dirty="0"/>
+              <a:t>Feature change notifications</a:t>
+            </a:r>
+          </a:p>
+          <a:p>
+            <a:pPr lvl="1"/>
+            <a:r>
+              <a:rPr lang="es-ES" sz="1600" i="1" dirty="0"/>
+              <a:t>Feature </a:t>
+            </a:r>
+            <a:r>
+              <a:rPr lang="es-ES" sz="1600" i="1" dirty="0" err="1"/>
+              <a:t>state</a:t>
+            </a:r>
+            <a:r>
+              <a:rPr lang="es-ES" sz="1600" i="1" dirty="0"/>
+              <a:t> http </a:t>
+            </a:r>
+            <a:r>
+              <a:rPr lang="es-ES" sz="1600" i="1" dirty="0" err="1"/>
+              <a:t>context</a:t>
+            </a:r>
+            <a:r>
+              <a:rPr lang="es-ES" sz="1600" i="1" dirty="0"/>
+              <a:t> request cache</a:t>
+            </a:r>
+          </a:p>
+        </p:txBody>
+      </p:sp>
+    </p:spTree>
+    <p:extLst>
+      <p:ext uri="{BB962C8B-B14F-4D97-AF65-F5344CB8AC3E}">
+        <p14:creationId xmlns:p14="http://schemas.microsoft.com/office/powerpoint/2010/main" val="1613570036"/>
       </p:ext>
     </p:extLst>
   </p:cSld>
@@ -14812,40 +16004,21 @@
               <a:rPr lang="es-ES" sz="2000" i="1" dirty="0"/>
               <a:t>PHP</a:t>
             </a:r>
+            <a:endParaRPr lang="es-ES" sz="1400" i="1" dirty="0"/>
           </a:p>
           <a:p>
             <a:pPr lvl="2"/>
             <a:r>
-              <a:rPr lang="es-ES" sz="1600" i="1" dirty="0"/>
-              <a:t>Etsy</a:t>
-            </a:r>
+              <a:rPr lang="es-ES" i="1" dirty="0" err="1"/>
+              <a:t>Qandidate</a:t>
+            </a:r>
+            <a:endParaRPr lang="es-ES" i="1" dirty="0"/>
           </a:p>
           <a:p>
             <a:pPr lvl="3"/>
             <a:r>
               <a:rPr lang="es-ES" sz="1400" i="1" dirty="0">
                 <a:hlinkClick r:id="rId2"/>
-              </a:rPr>
-              <a:t>https://github.com/etsy/feature</a:t>
-            </a:r>
-            <a:r>
-              <a:rPr lang="es-ES" sz="1400" i="1" dirty="0"/>
-              <a:t> </a:t>
-            </a:r>
-          </a:p>
-          <a:p>
-            <a:pPr lvl="2"/>
-            <a:r>
-              <a:rPr lang="es-ES" sz="1600" i="1" dirty="0" err="1"/>
-              <a:t>Qandidate</a:t>
-            </a:r>
-            <a:endParaRPr lang="es-ES" sz="1600" i="1" dirty="0"/>
-          </a:p>
-          <a:p>
-            <a:pPr lvl="3"/>
-            <a:r>
-              <a:rPr lang="es-ES" sz="1400" i="1" dirty="0">
-                <a:hlinkClick r:id="rId3"/>
               </a:rPr>
               <a:t>http://labs.qandidate.com/blog/2014/08/18/a-new-feature-toggling-library-for-php/</a:t>
             </a:r>
@@ -15013,7 +16186,7 @@
           <p:nvPr/>
         </p:nvPicPr>
         <p:blipFill>
-          <a:blip r:embed="rId4">
+          <a:blip r:embed="rId3">
             <a:extLst>
               <a:ext uri="{28A0092B-C50C-407E-A947-70E740481C1C}">
                 <a14:useLocalDpi xmlns:a14="http://schemas.microsoft.com/office/drawing/2010/main" val="0"/>
@@ -16023,15 +17196,7 @@
             </a:r>
             <a:r>
               <a:rPr lang="es-ES" sz="2400" i="1" dirty="0"/>
-              <a:t>“</a:t>
-            </a:r>
-            <a:r>
-              <a:rPr lang="es-ES" sz="2400" i="1" dirty="0" err="1"/>
-              <a:t>feature</a:t>
-            </a:r>
-            <a:r>
-              <a:rPr lang="es-ES" sz="2400" i="1" dirty="0"/>
-              <a:t> </a:t>
+              <a:t>“feature </a:t>
             </a:r>
             <a:r>
               <a:rPr lang="es-ES" sz="2400" i="1" dirty="0" err="1"/>

</xml_diff>

<commit_message>
Added new items into vnext roadmap for overview 101
</commit_message>
<xml_diff>
--- a/docs/slides/esquio-overview-101.pptx
+++ b/docs/slides/esquio-overview-101.pptx
@@ -15111,6 +15111,22 @@
             <a:pPr lvl="1"/>
             <a:r>
               <a:rPr lang="es-ES" sz="1600" i="1" dirty="0" err="1"/>
+              <a:t>MultiVariate</a:t>
+            </a:r>
+            <a:r>
+              <a:rPr lang="es-ES" sz="1600" i="1" dirty="0"/>
+              <a:t> Feature </a:t>
+            </a:r>
+            <a:r>
+              <a:rPr lang="es-ES" sz="1600" i="1" dirty="0" err="1"/>
+              <a:t>toggle</a:t>
+            </a:r>
+            <a:endParaRPr lang="es-ES" sz="1600" i="1" dirty="0"/>
+          </a:p>
+          <a:p>
+            <a:pPr lvl="1"/>
+            <a:r>
+              <a:rPr lang="es-ES" sz="1600" i="1" dirty="0" err="1"/>
               <a:t>Endpoint</a:t>
             </a:r>
             <a:r>

</xml_diff>